<commit_message>
add citation in Drain code and intro slides
</commit_message>
<xml_diff>
--- a/papers/LogAnalyzerIntro.pptx
+++ b/papers/LogAnalyzerIntro.pptx
@@ -5,10 +5,10 @@
     <p:sldMasterId id="2147483949" r:id="rId1"/>
   </p:sldMasterIdLst>
   <p:notesMasterIdLst>
-    <p:notesMasterId r:id="rId39"/>
+    <p:notesMasterId r:id="rId40"/>
   </p:notesMasterIdLst>
   <p:handoutMasterIdLst>
-    <p:handoutMasterId r:id="rId40"/>
+    <p:handoutMasterId r:id="rId41"/>
   </p:handoutMasterIdLst>
   <p:sldIdLst>
     <p:sldId id="258" r:id="rId2"/>
@@ -47,7 +47,8 @@
     <p:sldId id="315" r:id="rId35"/>
     <p:sldId id="311" r:id="rId36"/>
     <p:sldId id="312" r:id="rId37"/>
-    <p:sldId id="279" r:id="rId38"/>
+    <p:sldId id="319" r:id="rId38"/>
+    <p:sldId id="279" r:id="rId39"/>
   </p:sldIdLst>
   <p:sldSz cx="9144000" cy="6858000" type="screen4x3"/>
   <p:notesSz cx="7086600" cy="9359900"/>
@@ -763,7 +764,7 @@
           <a:p>
             <a:fld id="{4FF0A437-926C-4CA3-A06C-CCC97DC4BFA4}" type="slidenum">
               <a:rPr lang="en-US" smtClean="0"/>
-              <a:t>37</a:t>
+              <a:t>38</a:t>
             </a:fld>
             <a:endParaRPr lang="en-US" dirty="0"/>
           </a:p>
@@ -25833,12 +25834,6 @@
               </a:rPr>
               <a:t>Convert this labeled log to one-line format then and extract the label vector finally.</a:t>
             </a:r>
-            <a:endParaRPr lang="en-US" altLang="zh-CN" dirty="0">
-              <a:solidFill>
-                <a:prstClr val="black"/>
-              </a:solidFill>
-              <a:latin typeface="Consolas" panose="020B0609020204030204" pitchFamily="49" charset="0"/>
-            </a:endParaRPr>
           </a:p>
         </p:txBody>
       </p:sp>
@@ -37522,6 +37517,210 @@
           <a:chExt cx="0" cy="0"/>
         </a:xfrm>
       </p:grpSpPr>
+      <p:sp>
+        <p:nvSpPr>
+          <p:cNvPr id="2" name="Text Placeholder 1"/>
+          <p:cNvSpPr>
+            <a:spLocks noGrp="1"/>
+          </p:cNvSpPr>
+          <p:nvPr>
+            <p:ph type="body" sz="quarter" idx="10"/>
+          </p:nvPr>
+        </p:nvSpPr>
+        <p:spPr>
+          <a:xfrm>
+            <a:off x="309752" y="1232807"/>
+            <a:ext cx="7371207" cy="2340641"/>
+          </a:xfrm>
+        </p:spPr>
+        <p:txBody>
+          <a:bodyPr/>
+          <a:lstStyle/>
+          <a:p>
+            <a:r>
+              <a:rPr lang="en-US" altLang="zh-CN" dirty="0"/>
+              <a:t>Pinjia He, Jieming Zhu, Zibin Zheng, and Michael R. </a:t>
+            </a:r>
+            <a:r>
+              <a:rPr lang="en-US" altLang="zh-CN" dirty="0" smtClean="0"/>
+              <a:t>Lyu. </a:t>
+            </a:r>
+            <a:r>
+              <a:rPr lang="en-US" altLang="zh-CN" dirty="0" smtClean="0">
+                <a:hlinkClick r:id="rId2"/>
+              </a:rPr>
+              <a:t>Drain</a:t>
+            </a:r>
+            <a:r>
+              <a:rPr lang="en-US" altLang="zh-CN" dirty="0">
+                <a:hlinkClick r:id="rId2"/>
+              </a:rPr>
+              <a:t>: An Online Log Parsing Approach with Fixed Depth </a:t>
+            </a:r>
+            <a:r>
+              <a:rPr lang="en-US" altLang="zh-CN" dirty="0" smtClean="0">
+                <a:hlinkClick r:id="rId2"/>
+              </a:rPr>
+              <a:t>Tree</a:t>
+            </a:r>
+            <a:r>
+              <a:rPr lang="en-US" altLang="zh-CN" dirty="0" smtClean="0"/>
+              <a:t>, </a:t>
+            </a:r>
+            <a:r>
+              <a:rPr lang="en-US" altLang="zh-CN" i="1" dirty="0" smtClean="0"/>
+              <a:t>[</a:t>
+            </a:r>
+            <a:r>
+              <a:rPr lang="en-US" altLang="zh-CN" i="1" dirty="0"/>
+              <a:t>ICWS'17] </a:t>
+            </a:r>
+            <a:endParaRPr lang="en-US" altLang="zh-CN" i="1" dirty="0" smtClean="0"/>
+          </a:p>
+          <a:p>
+            <a:r>
+              <a:rPr lang="en-US" altLang="zh-CN" dirty="0" smtClean="0"/>
+              <a:t>Shilin </a:t>
+            </a:r>
+            <a:r>
+              <a:rPr lang="en-US" altLang="zh-CN" dirty="0"/>
+              <a:t>He, Jieming Zhu, Pinjia He, Michael R. Lyu. </a:t>
+            </a:r>
+            <a:r>
+              <a:rPr lang="en-US" altLang="zh-CN" dirty="0">
+                <a:hlinkClick r:id="rId3"/>
+              </a:rPr>
+              <a:t>Experience Report: System Log Analysis for Anomaly Detection</a:t>
+            </a:r>
+            <a:r>
+              <a:rPr lang="en-US" altLang="zh-CN" dirty="0"/>
+              <a:t>, </a:t>
+            </a:r>
+            <a:r>
+              <a:rPr lang="en-US" altLang="zh-CN" i="1" dirty="0"/>
+              <a:t>IEEE International Symposium on Software Reliability Engineering (ISSRE)</a:t>
+            </a:r>
+            <a:r>
+              <a:rPr lang="en-US" altLang="zh-CN" dirty="0"/>
+              <a:t>, 2016</a:t>
+            </a:r>
+            <a:r>
+              <a:rPr lang="en-US" altLang="zh-CN" dirty="0" smtClean="0"/>
+              <a:t>.</a:t>
+            </a:r>
+          </a:p>
+          <a:p>
+            <a:r>
+              <a:rPr lang="en-US" altLang="zh-CN" dirty="0">
+                <a:latin typeface="Consolas" panose="020B0609020204030204" pitchFamily="49" charset="0"/>
+                <a:hlinkClick r:id="rId4"/>
+              </a:rPr>
+              <a:t>https://</a:t>
+            </a:r>
+            <a:r>
+              <a:rPr lang="en-US" altLang="zh-CN" dirty="0" smtClean="0">
+                <a:latin typeface="Consolas" panose="020B0609020204030204" pitchFamily="49" charset="0"/>
+                <a:hlinkClick r:id="rId4"/>
+              </a:rPr>
+              <a:t>archive.ics.uci.edu/ml/datasets/Iris</a:t>
+            </a:r>
+            <a:endParaRPr lang="en-US" altLang="zh-CN" dirty="0" smtClean="0">
+              <a:latin typeface="Consolas" panose="020B0609020204030204" pitchFamily="49" charset="0"/>
+            </a:endParaRPr>
+          </a:p>
+          <a:p>
+            <a:r>
+              <a:rPr lang="en-US" altLang="zh-CN" dirty="0">
+                <a:latin typeface="Consolas" panose="020B0609020204030204" pitchFamily="49" charset="0"/>
+                <a:hlinkClick r:id="rId5"/>
+              </a:rPr>
+              <a:t>https://</a:t>
+            </a:r>
+            <a:r>
+              <a:rPr lang="en-US" altLang="zh-CN" dirty="0" smtClean="0">
+                <a:latin typeface="Consolas" panose="020B0609020204030204" pitchFamily="49" charset="0"/>
+                <a:hlinkClick r:id="rId5"/>
+              </a:rPr>
+              <a:t>www.datasciencecentral.com/profiles/blogs/introduction-to-classification-regression-trees-cart</a:t>
+            </a:r>
+            <a:endParaRPr lang="en-US" altLang="zh-CN" dirty="0" smtClean="0">
+              <a:latin typeface="Consolas" panose="020B0609020204030204" pitchFamily="49" charset="0"/>
+            </a:endParaRPr>
+          </a:p>
+        </p:txBody>
+      </p:sp>
+      <p:sp>
+        <p:nvSpPr>
+          <p:cNvPr id="3" name="Title 2"/>
+          <p:cNvSpPr>
+            <a:spLocks noGrp="1"/>
+          </p:cNvSpPr>
+          <p:nvPr>
+            <p:ph type="title"/>
+          </p:nvPr>
+        </p:nvSpPr>
+        <p:spPr>
+          <a:xfrm>
+            <a:off x="309753" y="577472"/>
+            <a:ext cx="8524494" cy="313932"/>
+          </a:xfrm>
+        </p:spPr>
+        <p:txBody>
+          <a:bodyPr/>
+          <a:lstStyle/>
+          <a:p>
+            <a:r>
+              <a:rPr lang="en-US" altLang="zh-CN" sz="2400" dirty="0" smtClean="0">
+                <a:latin typeface="Consolas" panose="020B0609020204030204" pitchFamily="49" charset="0"/>
+              </a:rPr>
+              <a:t>References</a:t>
+            </a:r>
+            <a:endParaRPr lang="en-US" sz="2400" dirty="0">
+              <a:latin typeface="Consolas" panose="020B0609020204030204" pitchFamily="49" charset="0"/>
+            </a:endParaRPr>
+          </a:p>
+        </p:txBody>
+      </p:sp>
+    </p:spTree>
+    <p:extLst>
+      <p:ext uri="{BB962C8B-B14F-4D97-AF65-F5344CB8AC3E}">
+        <p14:creationId xmlns:p14="http://schemas.microsoft.com/office/powerpoint/2010/main" val="2320378747"/>
+      </p:ext>
+    </p:extLst>
+  </p:cSld>
+  <p:clrMapOvr>
+    <a:masterClrMapping/>
+  </p:clrMapOvr>
+  <p:transition spd="med">
+    <p:fade/>
+  </p:transition>
+  <p:timing>
+    <p:tnLst>
+      <p:par>
+        <p:cTn id="1" dur="indefinite" restart="never" nodeType="tmRoot"/>
+      </p:par>
+    </p:tnLst>
+  </p:timing>
+</p:sld>
+</file>
+
+<file path=ppt/slides/slide38.xml><?xml version="1.0" encoding="utf-8"?>
+<p:sld xmlns:a="http://schemas.openxmlformats.org/drawingml/2006/main" xmlns:r="http://schemas.openxmlformats.org/officeDocument/2006/relationships" xmlns:p="http://schemas.openxmlformats.org/presentationml/2006/main">
+  <p:cSld>
+    <p:spTree>
+      <p:nvGrpSpPr>
+        <p:cNvPr id="1" name=""/>
+        <p:cNvGrpSpPr/>
+        <p:nvPr/>
+      </p:nvGrpSpPr>
+      <p:grpSpPr>
+        <a:xfrm>
+          <a:off x="0" y="0"/>
+          <a:ext cx="0" cy="0"/>
+          <a:chOff x="0" y="0"/>
+          <a:chExt cx="0" cy="0"/>
+        </a:xfrm>
+      </p:grpSpPr>
     </p:spTree>
     <p:extLst>
       <p:ext uri="{BB962C8B-B14F-4D97-AF65-F5344CB8AC3E}">

</xml_diff>

<commit_message>
revised intro slides, cont, and citations
</commit_message>
<xml_diff>
--- a/papers/LogAnalyzerIntro.pptx
+++ b/papers/LogAnalyzerIntro.pptx
@@ -262,7 +262,7 @@
           <a:p>
             <a:fld id="{C50E5DEF-305C-4654-A2C3-CA60F55E85EF}" type="datetimeFigureOut">
               <a:rPr lang="en-US" smtClean="0"/>
-              <a:t>10/8/2019</a:t>
+              <a:t>10/9/2019</a:t>
             </a:fld>
             <a:endParaRPr lang="en-US" dirty="0"/>
           </a:p>
@@ -427,7 +427,7 @@
           <a:p>
             <a:fld id="{20BAC53A-F092-42C8-9364-10E62332E740}" type="datetimeFigureOut">
               <a:rPr lang="en-US" smtClean="0"/>
-              <a:t>10/8/2019</a:t>
+              <a:t>10/9/2019</a:t>
             </a:fld>
             <a:endParaRPr lang="en-US" dirty="0"/>
           </a:p>
@@ -6418,8 +6418,17 @@
               <a:rPr lang="en-US" altLang="zh-CN" dirty="0">
                 <a:latin typeface="Consolas" panose="020B0609020204030204" pitchFamily="49" charset="0"/>
               </a:rPr>
-              <a:t>Need domain knowledge and developer maintain</a:t>
-            </a:r>
+              <a:t>Need domain knowledge and </a:t>
+            </a:r>
+            <a:r>
+              <a:rPr lang="en-US" altLang="zh-CN" dirty="0" smtClean="0">
+                <a:latin typeface="Consolas" panose="020B0609020204030204" pitchFamily="49" charset="0"/>
+              </a:rPr>
+              <a:t>developer’s maintenance</a:t>
+            </a:r>
+            <a:endParaRPr lang="en-US" altLang="zh-CN" dirty="0">
+              <a:latin typeface="Consolas" panose="020B0609020204030204" pitchFamily="49" charset="0"/>
+            </a:endParaRPr>
           </a:p>
           <a:p>
             <a:pPr lvl="1"/>
@@ -6500,8 +6509,17 @@
               <a:rPr lang="en-US" sz="2400" dirty="0">
                 <a:latin typeface="Consolas" panose="020B0609020204030204" pitchFamily="49" charset="0"/>
               </a:rPr>
-              <a:t>Parsing Algorithm</a:t>
-            </a:r>
+              <a:t>Parsing </a:t>
+            </a:r>
+            <a:r>
+              <a:rPr lang="en-US" sz="2400" dirty="0" smtClean="0">
+                <a:latin typeface="Consolas" panose="020B0609020204030204" pitchFamily="49" charset="0"/>
+              </a:rPr>
+              <a:t>Algorithm Overview</a:t>
+            </a:r>
+            <a:endParaRPr lang="en-US" sz="2400" dirty="0">
+              <a:latin typeface="Consolas" panose="020B0609020204030204" pitchFamily="49" charset="0"/>
+            </a:endParaRPr>
           </a:p>
         </p:txBody>
       </p:sp>
@@ -7249,65 +7267,147 @@
           <a:chExt cx="0" cy="0"/>
         </a:xfrm>
       </p:grpSpPr>
-      <p:sp>
-        <p:nvSpPr>
-          <p:cNvPr id="2" name="Text Placeholder 1"/>
-          <p:cNvSpPr>
-            <a:spLocks noGrp="1"/>
-          </p:cNvSpPr>
-          <p:nvPr>
-            <p:ph type="body" sz="quarter" idx="10"/>
-          </p:nvPr>
-        </p:nvSpPr>
-        <p:spPr>
-          <a:xfrm>
-            <a:off x="309753" y="1232807"/>
-            <a:ext cx="8524494" cy="1157240"/>
-          </a:xfrm>
-        </p:spPr>
-        <p:txBody>
-          <a:bodyPr/>
-          <a:lstStyle/>
-          <a:p>
-            <a:r>
-              <a:rPr lang="zh-CN" altLang="zh-CN" dirty="0">
-                <a:latin typeface="Consolas" panose="020B0609020204030204" pitchFamily="49" charset="0"/>
-              </a:rPr>
-              <a:t>The clustering problem is often defined as follows:</a:t>
-            </a:r>
-          </a:p>
-          <a:p>
-            <a:pPr lvl="1"/>
-            <a:r>
-              <a:rPr lang="zh-CN" altLang="zh-CN" dirty="0">
-                <a:latin typeface="Consolas" panose="020B0609020204030204" pitchFamily="49" charset="0"/>
-              </a:rPr>
-              <a:t>Given a set of points with </a:t>
-            </a:r>
-            <a:r>
-              <a:rPr lang="en-US" altLang="zh-CN" i="1" dirty="0">
-                <a:latin typeface="Consolas" panose="020B0609020204030204" pitchFamily="49" charset="0"/>
-              </a:rPr>
-              <a:t>n </a:t>
-            </a:r>
-            <a:r>
-              <a:rPr lang="en-US" altLang="zh-CN" dirty="0">
-                <a:latin typeface="Consolas" panose="020B0609020204030204" pitchFamily="49" charset="0"/>
-              </a:rPr>
-              <a:t>attributes in the data space Rn, find a partition of points into clusters so that points within each cluster are close (similar) to each other.</a:t>
-            </a:r>
-          </a:p>
-          <a:p>
-            <a:pPr lvl="1"/>
-            <a:r>
-              <a:rPr lang="en-US" altLang="zh-CN" dirty="0">
-                <a:latin typeface="Consolas" panose="020B0609020204030204" pitchFamily="49" charset="0"/>
-              </a:rPr>
-              <a:t>E.g. </a:t>
-            </a:r>
-          </a:p>
-        </p:txBody>
-      </p:sp>
+      <mc:AlternateContent xmlns:mc="http://schemas.openxmlformats.org/markup-compatibility/2006">
+        <mc:Choice xmlns:a14="http://schemas.microsoft.com/office/drawing/2010/main" Requires="a14">
+          <p:sp>
+            <p:nvSpPr>
+              <p:cNvPr id="2" name="Text Placeholder 1"/>
+              <p:cNvSpPr>
+                <a:spLocks noGrp="1"/>
+              </p:cNvSpPr>
+              <p:nvPr>
+                <p:ph type="body" sz="quarter" idx="10"/>
+              </p:nvPr>
+            </p:nvSpPr>
+            <p:spPr>
+              <a:xfrm>
+                <a:off x="309753" y="1232807"/>
+                <a:ext cx="8524494" cy="1157240"/>
+              </a:xfrm>
+            </p:spPr>
+            <p:txBody>
+              <a:bodyPr/>
+              <a:lstStyle/>
+              <a:p>
+                <a:r>
+                  <a:rPr lang="zh-CN" altLang="zh-CN" dirty="0" smtClean="0">
+                    <a:latin typeface="Consolas" panose="020B0609020204030204" pitchFamily="49" charset="0"/>
+                  </a:rPr>
+                  <a:t>The clustering problem is often defined as follows:</a:t>
+                </a:r>
+              </a:p>
+              <a:p>
+                <a:pPr lvl="1"/>
+                <a:r>
+                  <a:rPr lang="zh-CN" altLang="zh-CN" dirty="0">
+                    <a:latin typeface="Consolas" panose="020B0609020204030204" pitchFamily="49" charset="0"/>
+                  </a:rPr>
+                  <a:t>Given a set of points with </a:t>
+                </a:r>
+                <a:r>
+                  <a:rPr lang="en-US" altLang="zh-CN" i="1" dirty="0">
+                    <a:latin typeface="Consolas" panose="020B0609020204030204" pitchFamily="49" charset="0"/>
+                  </a:rPr>
+                  <a:t>n </a:t>
+                </a:r>
+                <a:r>
+                  <a:rPr lang="en-US" altLang="zh-CN" dirty="0">
+                    <a:latin typeface="Consolas" panose="020B0609020204030204" pitchFamily="49" charset="0"/>
+                  </a:rPr>
+                  <a:t>attributes in the data space </a:t>
+                </a:r>
+                <a14:m>
+                  <m:oMath xmlns:m="http://schemas.openxmlformats.org/officeDocument/2006/math">
+                    <m:sSup>
+                      <m:sSupPr>
+                        <m:ctrlPr>
+                          <a:rPr lang="en-US" altLang="zh-CN" i="1" smtClean="0">
+                            <a:latin typeface="Cambria Math" panose="02040503050406030204" pitchFamily="18" charset="0"/>
+                          </a:rPr>
+                        </m:ctrlPr>
+                      </m:sSupPr>
+                      <m:e>
+                        <m:r>
+                          <a:rPr lang="en-US" altLang="zh-CN" b="0" i="1" smtClean="0">
+                            <a:latin typeface="Cambria Math" panose="02040503050406030204" pitchFamily="18" charset="0"/>
+                          </a:rPr>
+                          <m:t>𝑅</m:t>
+                        </m:r>
+                      </m:e>
+                      <m:sup>
+                        <m:r>
+                          <a:rPr lang="en-US" altLang="zh-CN" b="0" i="1" smtClean="0">
+                            <a:latin typeface="Cambria Math" panose="02040503050406030204" pitchFamily="18" charset="0"/>
+                          </a:rPr>
+                          <m:t>𝑛</m:t>
+                        </m:r>
+                      </m:sup>
+                    </m:sSup>
+                  </m:oMath>
+                </a14:m>
+                <a:r>
+                  <a:rPr lang="en-US" altLang="zh-CN" dirty="0" smtClean="0">
+                    <a:latin typeface="Consolas" panose="020B0609020204030204" pitchFamily="49" charset="0"/>
+                  </a:rPr>
+                  <a:t>, </a:t>
+                </a:r>
+                <a:r>
+                  <a:rPr lang="en-US" altLang="zh-CN" dirty="0">
+                    <a:latin typeface="Consolas" panose="020B0609020204030204" pitchFamily="49" charset="0"/>
+                  </a:rPr>
+                  <a:t>find a partition of points into clusters so that points within each cluster are close (similar) to each other.</a:t>
+                </a:r>
+              </a:p>
+              <a:p>
+                <a:pPr lvl="1"/>
+                <a:r>
+                  <a:rPr lang="en-US" altLang="zh-CN" dirty="0">
+                    <a:latin typeface="Consolas" panose="020B0609020204030204" pitchFamily="49" charset="0"/>
+                  </a:rPr>
+                  <a:t>E.g. </a:t>
+                </a:r>
+              </a:p>
+            </p:txBody>
+          </p:sp>
+        </mc:Choice>
+        <mc:Fallback>
+          <p:sp>
+            <p:nvSpPr>
+              <p:cNvPr id="2" name="Text Placeholder 1"/>
+              <p:cNvSpPr>
+                <a:spLocks noGrp="1" noRot="1" noChangeAspect="1" noMove="1" noResize="1" noEditPoints="1" noAdjustHandles="1" noChangeArrowheads="1" noChangeShapeType="1" noTextEdit="1"/>
+              </p:cNvSpPr>
+              <p:nvPr>
+                <p:ph type="body" sz="quarter" idx="10"/>
+              </p:nvPr>
+            </p:nvSpPr>
+            <p:spPr>
+              <a:xfrm>
+                <a:off x="309753" y="1232807"/>
+                <a:ext cx="8524494" cy="1157240"/>
+              </a:xfrm>
+              <a:blipFill>
+                <a:blip r:embed="rId2"/>
+                <a:stretch>
+                  <a:fillRect l="-1574" t="-8947" b="-8947"/>
+                </a:stretch>
+              </a:blipFill>
+            </p:spPr>
+            <p:txBody>
+              <a:bodyPr/>
+              <a:lstStyle/>
+              <a:p>
+                <a:r>
+                  <a:rPr lang="zh-CN" altLang="en-US">
+                    <a:noFill/>
+                  </a:rPr>
+                  <a:t> </a:t>
+                </a:r>
+              </a:p>
+            </p:txBody>
+          </p:sp>
+        </mc:Fallback>
+      </mc:AlternateContent>
       <p:sp>
         <p:nvSpPr>
           <p:cNvPr id="3" name="Title 2"/>
@@ -7332,7 +7432,19 @@
               <a:rPr lang="en-US" sz="2400" dirty="0">
                 <a:latin typeface="Consolas" panose="020B0609020204030204" pitchFamily="49" charset="0"/>
               </a:rPr>
-              <a:t>Parsing Algorithm, cont.</a:t>
+              <a:t>Parsing </a:t>
+            </a:r>
+            <a:r>
+              <a:rPr lang="en-US" sz="2400" dirty="0" smtClean="0">
+                <a:latin typeface="Consolas" panose="020B0609020204030204" pitchFamily="49" charset="0"/>
+              </a:rPr>
+              <a:t>Algorithm Overview, </a:t>
+            </a:r>
+            <a:r>
+              <a:rPr lang="en-US" sz="2400" dirty="0">
+                <a:latin typeface="Consolas" panose="020B0609020204030204" pitchFamily="49" charset="0"/>
+              </a:rPr>
+              <a:t>cont.</a:t>
             </a:r>
           </a:p>
         </p:txBody>
@@ -8083,7 +8195,7 @@
           <p:nvPr/>
         </p:nvPicPr>
         <p:blipFill>
-          <a:blip r:embed="rId2"/>
+          <a:blip r:embed="rId3"/>
           <a:stretch>
             <a:fillRect/>
           </a:stretch>
@@ -8393,8 +8505,17 @@
               <a:rPr lang="en-US" altLang="zh-CN" dirty="0">
                 <a:latin typeface="Consolas" panose="020B0609020204030204" pitchFamily="49" charset="0"/>
               </a:rPr>
-              <a:t>When log lines are more than 100M, time/space complexities are big issue.</a:t>
-            </a:r>
+              <a:t>When log lines are more than 100M, time/space complexities are big </a:t>
+            </a:r>
+            <a:r>
+              <a:rPr lang="en-US" altLang="zh-CN" dirty="0" smtClean="0">
+                <a:latin typeface="Consolas" panose="020B0609020204030204" pitchFamily="49" charset="0"/>
+              </a:rPr>
+              <a:t>issues.</a:t>
+            </a:r>
+            <a:endParaRPr lang="en-US" altLang="zh-CN" dirty="0">
+              <a:latin typeface="Consolas" panose="020B0609020204030204" pitchFamily="49" charset="0"/>
+            </a:endParaRPr>
           </a:p>
           <a:p>
             <a:pPr lvl="1"/>
@@ -8402,7 +8523,19 @@
               <a:rPr lang="en-US" altLang="zh-CN" dirty="0">
                 <a:latin typeface="Consolas" panose="020B0609020204030204" pitchFamily="49" charset="0"/>
               </a:rPr>
-              <a:t>I selected one developed by CUHK, called Drain. Fast, but still some issues when using it, need workarounds.</a:t>
+              <a:t>I selected one developed by CUHK, called Drain. Fast, but </a:t>
+            </a:r>
+            <a:r>
+              <a:rPr lang="en-US" altLang="zh-CN" dirty="0" smtClean="0">
+                <a:latin typeface="Consolas" panose="020B0609020204030204" pitchFamily="49" charset="0"/>
+              </a:rPr>
+              <a:t>it still has some </a:t>
+            </a:r>
+            <a:r>
+              <a:rPr lang="en-US" altLang="zh-CN" dirty="0">
+                <a:latin typeface="Consolas" panose="020B0609020204030204" pitchFamily="49" charset="0"/>
+              </a:rPr>
+              <a:t>issues when using it, need workarounds.</a:t>
             </a:r>
           </a:p>
           <a:p>
@@ -37530,7 +37663,7 @@
         <p:spPr>
           <a:xfrm>
             <a:off x="309752" y="1232807"/>
-            <a:ext cx="7371207" cy="2340641"/>
+            <a:ext cx="7371207" cy="2705356"/>
           </a:xfrm>
         </p:spPr>
         <p:txBody>
@@ -37622,6 +37755,33 @@
                 <a:latin typeface="Consolas" panose="020B0609020204030204" pitchFamily="49" charset="0"/>
                 <a:hlinkClick r:id="rId4"/>
               </a:rPr>
+              <a:t>en.wikipedia.org/wiki/Tf-idf</a:t>
+            </a:r>
+            <a:endParaRPr lang="en-US" altLang="zh-CN" dirty="0">
+              <a:latin typeface="Consolas" panose="020B0609020204030204" pitchFamily="49" charset="0"/>
+              <a:hlinkClick r:id="rId4"/>
+            </a:endParaRPr>
+          </a:p>
+          <a:p>
+            <a:r>
+              <a:rPr lang="en-US" altLang="zh-CN" dirty="0" smtClean="0">
+                <a:latin typeface="Consolas" panose="020B0609020204030204" pitchFamily="49" charset="0"/>
+                <a:hlinkClick r:id="rId5"/>
+              </a:rPr>
+              <a:t>https</a:t>
+            </a:r>
+            <a:r>
+              <a:rPr lang="en-US" altLang="zh-CN" dirty="0">
+                <a:latin typeface="Consolas" panose="020B0609020204030204" pitchFamily="49" charset="0"/>
+                <a:hlinkClick r:id="rId5"/>
+              </a:rPr>
+              <a:t>://</a:t>
+            </a:r>
+            <a:r>
+              <a:rPr lang="en-US" altLang="zh-CN" dirty="0" smtClean="0">
+                <a:latin typeface="Consolas" panose="020B0609020204030204" pitchFamily="49" charset="0"/>
+                <a:hlinkClick r:id="rId5"/>
+              </a:rPr>
               <a:t>archive.ics.uci.edu/ml/datasets/Iris</a:t>
             </a:r>
             <a:endParaRPr lang="en-US" altLang="zh-CN" dirty="0" smtClean="0">
@@ -37632,14 +37792,14 @@
             <a:r>
               <a:rPr lang="en-US" altLang="zh-CN" dirty="0">
                 <a:latin typeface="Consolas" panose="020B0609020204030204" pitchFamily="49" charset="0"/>
-                <a:hlinkClick r:id="rId5"/>
+                <a:hlinkClick r:id="rId6"/>
               </a:rPr>
               <a:t>https://</a:t>
             </a:r>
             <a:r>
               <a:rPr lang="en-US" altLang="zh-CN" dirty="0" smtClean="0">
                 <a:latin typeface="Consolas" panose="020B0609020204030204" pitchFamily="49" charset="0"/>
-                <a:hlinkClick r:id="rId5"/>
+                <a:hlinkClick r:id="rId6"/>
               </a:rPr>
               <a:t>www.datasciencecentral.com/profiles/blogs/introduction-to-classification-regression-trees-cart</a:t>
             </a:r>
@@ -38169,13 +38329,24 @@
               <a:t>loganalyzer/entrance/demo_unix.sh </a:t>
             </a:r>
             <a:r>
-              <a:rPr lang="en-US" altLang="zh-CN" i="1" dirty="0">
+              <a:rPr lang="en-US" altLang="zh-CN" i="1" dirty="0" smtClean="0">
                 <a:solidFill>
                   <a:schemeClr val="accent4"/>
                 </a:solidFill>
                 <a:latin typeface="Consolas" panose="020B0609020204030204" pitchFamily="49" charset="0"/>
               </a:rPr>
-              <a:t>&amp;</a:t>
+              <a:t>or</a:t>
+            </a:r>
+            <a:r>
+              <a:rPr lang="en-US" altLang="zh-CN" i="1" dirty="0" smtClean="0">
+                <a:solidFill>
+                  <a:schemeClr val="accent2">
+                    <a:lumMod val="75000"/>
+                  </a:schemeClr>
+                </a:solidFill>
+                <a:latin typeface="Consolas" panose="020B0609020204030204" pitchFamily="49" charset="0"/>
+              </a:rPr>
+              <a:t> </a:t>
             </a:r>
             <a:r>
               <a:rPr lang="en-US" altLang="zh-CN" i="1" dirty="0">
@@ -38186,7 +38357,7 @@
                 </a:solidFill>
                 <a:latin typeface="Consolas" panose="020B0609020204030204" pitchFamily="49" charset="0"/>
               </a:rPr>
-              <a:t> demo_win.bat</a:t>
+              <a:t>demo_win.bat</a:t>
             </a:r>
             <a:endParaRPr lang="en-US" altLang="zh-CN" dirty="0">
               <a:latin typeface="Consolas" panose="020B0609020204030204" pitchFamily="49" charset="0"/>
@@ -38217,7 +38388,19 @@
               <a:rPr lang="en-US" altLang="zh-CN" dirty="0">
                 <a:latin typeface="Consolas" panose="020B0609020204030204" pitchFamily="49" charset="0"/>
               </a:rPr>
-              <a:t>One csv file is the result of machine learning way</a:t>
+              <a:t>One csv file is </a:t>
+            </a:r>
+            <a:r>
+              <a:rPr lang="en-US" altLang="zh-CN" dirty="0" smtClean="0">
+                <a:latin typeface="Consolas" panose="020B0609020204030204" pitchFamily="49" charset="0"/>
+              </a:rPr>
+              <a:t>for the </a:t>
+            </a:r>
+            <a:r>
+              <a:rPr lang="en-US" altLang="zh-CN" dirty="0">
+                <a:latin typeface="Consolas" panose="020B0609020204030204" pitchFamily="49" charset="0"/>
+              </a:rPr>
+              <a:t>result of machine learning way</a:t>
             </a:r>
           </a:p>
           <a:p>
@@ -38226,7 +38409,19 @@
               <a:rPr lang="en-US" altLang="zh-CN" dirty="0">
                 <a:latin typeface="Consolas" panose="020B0609020204030204" pitchFamily="49" charset="0"/>
               </a:rPr>
-              <a:t>Another csv is old school way</a:t>
+              <a:t>Another csv is </a:t>
+            </a:r>
+            <a:r>
+              <a:rPr lang="en-US" altLang="zh-CN" dirty="0" smtClean="0">
+                <a:latin typeface="Consolas" panose="020B0609020204030204" pitchFamily="49" charset="0"/>
+              </a:rPr>
+              <a:t>for old </a:t>
+            </a:r>
+            <a:r>
+              <a:rPr lang="en-US" altLang="zh-CN" dirty="0">
+                <a:latin typeface="Consolas" panose="020B0609020204030204" pitchFamily="49" charset="0"/>
+              </a:rPr>
+              <a:t>school way</a:t>
             </a:r>
           </a:p>
           <a:p>
@@ -38593,8 +38788,25 @@
                   <a:latin typeface="Consolas" panose="020B0609020204030204" pitchFamily="49" charset="0"/>
                   <a:cs typeface="Arial" pitchFamily="34" charset="0"/>
                 </a:rPr>
-                <a:t>The window size can be pre-defined as well as the window step size. It depends if the detection algorithm works good</a:t>
+                <a:t>The window size can be pre-defined as well as the window step size. It depends if the detection algorithm works </a:t>
               </a:r>
+              <a:r>
+                <a:rPr lang="en-US" altLang="zh-CN" sz="1500" dirty="0" smtClean="0">
+                  <a:solidFill>
+                    <a:schemeClr val="tx1"/>
+                  </a:solidFill>
+                  <a:latin typeface="Consolas" panose="020B0609020204030204" pitchFamily="49" charset="0"/>
+                  <a:cs typeface="Arial" pitchFamily="34" charset="0"/>
+                </a:rPr>
+                <a:t>well</a:t>
+              </a:r>
+              <a:endParaRPr lang="en-US" altLang="zh-CN" sz="1500" dirty="0">
+                <a:solidFill>
+                  <a:schemeClr val="tx1"/>
+                </a:solidFill>
+                <a:latin typeface="Consolas" panose="020B0609020204030204" pitchFamily="49" charset="0"/>
+                <a:cs typeface="Arial" pitchFamily="34" charset="0"/>
+              </a:endParaRPr>
             </a:p>
             <a:p>
               <a:pPr marL="171450" indent="-171450">
@@ -38893,7 +39105,27 @@
                   <a:latin typeface="Consolas" panose="020B0609020204030204" pitchFamily="49" charset="0"/>
                   <a:cs typeface="Arial" pitchFamily="34" charset="0"/>
                 </a:rPr>
-                <a:t>Timestamp: The fault location</a:t>
+                <a:t>Timestamp: The </a:t>
+              </a:r>
+              <a:r>
+                <a:rPr lang="en-US" sz="1500" dirty="0" smtClean="0">
+                  <a:solidFill>
+                    <a:schemeClr val="tx1"/>
+                  </a:solidFill>
+                  <a:latin typeface="Consolas" panose="020B0609020204030204" pitchFamily="49" charset="0"/>
+                  <a:cs typeface="Arial" pitchFamily="34" charset="0"/>
+                </a:rPr>
+                <a:t>error </a:t>
+              </a:r>
+              <a:r>
+                <a:rPr lang="en-US" sz="1500" dirty="0">
+                  <a:solidFill>
+                    <a:schemeClr val="tx1"/>
+                  </a:solidFill>
+                  <a:latin typeface="Consolas" panose="020B0609020204030204" pitchFamily="49" charset="0"/>
+                  <a:cs typeface="Arial" pitchFamily="34" charset="0"/>
+                </a:rPr>
+                <a:t>location</a:t>
               </a:r>
             </a:p>
             <a:p>
@@ -38940,8 +39172,25 @@
                   <a:latin typeface="Consolas" panose="020B0609020204030204" pitchFamily="49" charset="0"/>
                   <a:cs typeface="Arial" pitchFamily="34" charset="0"/>
                 </a:rPr>
-                <a:t>Description: What is the fault</a:t>
+                <a:t>Description: What is the </a:t>
               </a:r>
+              <a:r>
+                <a:rPr lang="en-US" sz="1500" dirty="0" smtClean="0">
+                  <a:solidFill>
+                    <a:schemeClr val="tx1"/>
+                  </a:solidFill>
+                  <a:latin typeface="Consolas" panose="020B0609020204030204" pitchFamily="49" charset="0"/>
+                  <a:cs typeface="Arial" pitchFamily="34" charset="0"/>
+                </a:rPr>
+                <a:t>error</a:t>
+              </a:r>
+              <a:endParaRPr lang="en-US" sz="1500" dirty="0">
+                <a:solidFill>
+                  <a:schemeClr val="tx1"/>
+                </a:solidFill>
+                <a:latin typeface="Consolas" panose="020B0609020204030204" pitchFamily="49" charset="0"/>
+                <a:cs typeface="Arial" pitchFamily="34" charset="0"/>
+              </a:endParaRPr>
             </a:p>
             <a:p>
               <a:pPr marL="171450" indent="-171450">
@@ -38987,33 +39236,25 @@
                   <a:latin typeface="Consolas" panose="020B0609020204030204" pitchFamily="49" charset="0"/>
                   <a:cs typeface="Arial" pitchFamily="34" charset="0"/>
                 </a:rPr>
-                <a:t>Suggestion: What might be the cause</a:t>
+                <a:t>Suggestion: What might be the </a:t>
               </a:r>
-            </a:p>
-            <a:p>
-              <a:pPr marL="385763" lvl="1" indent="-170260">
-                <a:lnSpc>
-                  <a:spcPct val="90000"/>
-                </a:lnSpc>
-                <a:spcBef>
-                  <a:spcPts val="300"/>
-                </a:spcBef>
-                <a:buClr>
-                  <a:schemeClr val="tx2"/>
-                </a:buClr>
-                <a:buFont typeface="Arial" panose="020B0604020202020204" pitchFamily="34" charset="0"/>
-                <a:buChar char="–"/>
-              </a:pPr>
               <a:r>
-                <a:rPr lang="en-US" sz="1350" dirty="0">
+                <a:rPr lang="en-US" sz="1500" dirty="0" smtClean="0">
                   <a:solidFill>
                     <a:schemeClr val="tx1"/>
                   </a:solidFill>
                   <a:latin typeface="Consolas" panose="020B0609020204030204" pitchFamily="49" charset="0"/>
                   <a:cs typeface="Arial" pitchFamily="34" charset="0"/>
                 </a:rPr>
-                <a:t>Possible solutions</a:t>
+                <a:t>cause and possible solutions</a:t>
               </a:r>
+              <a:endParaRPr lang="en-US" sz="1500" dirty="0">
+                <a:solidFill>
+                  <a:schemeClr val="tx1"/>
+                </a:solidFill>
+                <a:latin typeface="Consolas" panose="020B0609020204030204" pitchFamily="49" charset="0"/>
+                <a:cs typeface="Arial" pitchFamily="34" charset="0"/>
+              </a:endParaRPr>
             </a:p>
           </p:txBody>
         </p:sp>

</xml_diff>

<commit_message>
checkin the new Drain2 implementation, namely, Drainjournal
</commit_message>
<xml_diff>
--- a/papers/LogAnalyzerIntro.pptx
+++ b/papers/LogAnalyzerIntro.pptx
@@ -262,7 +262,7 @@
           <a:p>
             <a:fld id="{C50E5DEF-305C-4654-A2C3-CA60F55E85EF}" type="datetimeFigureOut">
               <a:rPr lang="en-US" smtClean="0"/>
-              <a:t>10/9/2019</a:t>
+              <a:t>10/10/2019</a:t>
             </a:fld>
             <a:endParaRPr lang="en-US" dirty="0"/>
           </a:p>
@@ -427,7 +427,7 @@
           <a:p>
             <a:fld id="{20BAC53A-F092-42C8-9364-10E62332E740}" type="datetimeFigureOut">
               <a:rPr lang="en-US" smtClean="0"/>
-              <a:t>10/9/2019</a:t>
+              <a:t>10/10/2019</a:t>
             </a:fld>
             <a:endParaRPr lang="en-US" dirty="0"/>
           </a:p>
@@ -7267,8 +7267,8 @@
           <a:chExt cx="0" cy="0"/>
         </a:xfrm>
       </p:grpSpPr>
-      <mc:AlternateContent xmlns:mc="http://schemas.openxmlformats.org/markup-compatibility/2006">
-        <mc:Choice xmlns:a14="http://schemas.microsoft.com/office/drawing/2010/main" Requires="a14">
+      <mc:AlternateContent xmlns:mc="http://schemas.openxmlformats.org/markup-compatibility/2006" xmlns:a14="http://schemas.microsoft.com/office/drawing/2010/main">
+        <mc:Choice Requires="a14">
           <p:sp>
             <p:nvSpPr>
               <p:cNvPr id="2" name="Text Placeholder 1"/>
@@ -7370,7 +7370,7 @@
             </p:txBody>
           </p:sp>
         </mc:Choice>
-        <mc:Fallback>
+        <mc:Fallback xmlns="">
           <p:sp>
             <p:nvSpPr>
               <p:cNvPr id="2" name="Text Placeholder 1"/>
@@ -34586,7 +34586,19 @@
           <a:p>
             <a:r>
               <a:rPr lang="en-US" altLang="zh-CN" dirty="0"/>
-              <a:t>It’s done in Log Parsing stage. Train and Test logs all parse Parsing 1</a:t>
+              <a:t>It’s done in Log Parsing stage. Train and Test logs </a:t>
+            </a:r>
+            <a:r>
+              <a:rPr lang="en-US" altLang="zh-CN"/>
+              <a:t>all </a:t>
+            </a:r>
+            <a:r>
+              <a:rPr lang="en-US" altLang="zh-CN" smtClean="0"/>
+              <a:t>pass </a:t>
+            </a:r>
+            <a:r>
+              <a:rPr lang="en-US" altLang="zh-CN" dirty="0"/>
+              <a:t>Parsing 1</a:t>
             </a:r>
             <a:r>
               <a:rPr lang="en-US" altLang="zh-CN" baseline="30000" dirty="0"/>
@@ -35962,6 +35974,13 @@
   <p:transition spd="med">
     <p:fade/>
   </p:transition>
+  <p:timing>
+    <p:tnLst>
+      <p:par>
+        <p:cTn id="1" dur="indefinite" restart="never" nodeType="tmRoot"/>
+      </p:par>
+    </p:tnLst>
+  </p:timing>
 </p:sld>
 </file>
 

</xml_diff>

<commit_message>
update Drain2 and delete unused data file
</commit_message>
<xml_diff>
--- a/papers/LogAnalyzerIntro.pptx
+++ b/papers/LogAnalyzerIntro.pptx
@@ -262,7 +262,7 @@
           <a:p>
             <a:fld id="{C50E5DEF-305C-4654-A2C3-CA60F55E85EF}" type="datetimeFigureOut">
               <a:rPr lang="en-US" smtClean="0"/>
-              <a:t>10/10/2019</a:t>
+              <a:t>10/25/2019</a:t>
             </a:fld>
             <a:endParaRPr lang="en-US" dirty="0"/>
           </a:p>
@@ -427,7 +427,7 @@
           <a:p>
             <a:fld id="{20BAC53A-F092-42C8-9364-10E62332E740}" type="datetimeFigureOut">
               <a:rPr lang="en-US" smtClean="0"/>
-              <a:t>10/10/2019</a:t>
+              <a:t>10/25/2019</a:t>
             </a:fld>
             <a:endParaRPr lang="en-US" dirty="0"/>
           </a:p>
@@ -8909,9 +8909,9 @@
         <p:grpSpPr>
           <a:xfrm>
             <a:off x="6201933" y="2510649"/>
-            <a:ext cx="1649553" cy="569102"/>
+            <a:ext cx="1649553" cy="626860"/>
             <a:chOff x="6201933" y="2510649"/>
-            <a:chExt cx="1649553" cy="569102"/>
+            <a:chExt cx="1649553" cy="626860"/>
           </a:xfrm>
         </p:grpSpPr>
         <p:sp>
@@ -8922,8 +8922,8 @@
           </p:nvSpPr>
           <p:spPr>
             <a:xfrm>
-              <a:off x="6484324" y="2878289"/>
-              <a:ext cx="1367162" cy="201462"/>
+              <a:off x="6484324" y="2908028"/>
+              <a:ext cx="1367162" cy="229481"/>
             </a:xfrm>
             <a:prstGeom prst="rect">
               <a:avLst/>
@@ -8985,7 +8985,7 @@
           <p:spPr>
             <a:xfrm>
               <a:off x="6201933" y="2510649"/>
-              <a:ext cx="965972" cy="367640"/>
+              <a:ext cx="965972" cy="397379"/>
             </a:xfrm>
             <a:prstGeom prst="straightConnector1">
               <a:avLst/>
@@ -9021,10 +9021,10 @@
         </p:nvGrpSpPr>
         <p:grpSpPr>
           <a:xfrm>
-            <a:off x="6935224" y="3084584"/>
-            <a:ext cx="1552113" cy="774145"/>
-            <a:chOff x="6935224" y="3084584"/>
-            <a:chExt cx="1552113" cy="774145"/>
+            <a:off x="6935224" y="3137509"/>
+            <a:ext cx="1552113" cy="721220"/>
+            <a:chOff x="6935224" y="3137509"/>
+            <a:chExt cx="1552113" cy="721220"/>
           </a:xfrm>
         </p:grpSpPr>
         <p:sp>
@@ -9091,14 +9091,15 @@
           <p:nvCxnSpPr>
             <p:cNvPr id="48" name="Straight Arrow Connector 47"/>
             <p:cNvCxnSpPr>
+              <a:stCxn id="13" idx="2"/>
               <a:endCxn id="14" idx="0"/>
             </p:cNvCxnSpPr>
             <p:nvPr/>
           </p:nvCxnSpPr>
           <p:spPr>
             <a:xfrm>
-              <a:off x="7167905" y="3084584"/>
-              <a:ext cx="543376" cy="511839"/>
+              <a:off x="7167905" y="3137509"/>
+              <a:ext cx="543376" cy="458914"/>
             </a:xfrm>
             <a:prstGeom prst="straightConnector1">
               <a:avLst/>
@@ -28028,7 +28029,7 @@
         <p:spPr>
           <a:xfrm>
             <a:off x="309753" y="5543427"/>
-            <a:ext cx="3635231" cy="1157240"/>
+            <a:ext cx="3887778" cy="1157240"/>
           </a:xfrm>
           <a:prstGeom prst="rect">
             <a:avLst/>
@@ -28240,23 +28241,35 @@
           <a:p>
             <a:pPr lvl="1"/>
             <a:r>
-              <a:rPr lang="en-US" altLang="zh-CN" dirty="0" err="1"/>
+              <a:rPr lang="en-US" altLang="zh-CN" dirty="0" err="1">
+                <a:latin typeface="Consolas" panose="020B0609020204030204" pitchFamily="49" charset="0"/>
+              </a:rPr>
               <a:t>tf</a:t>
             </a:r>
             <a:r>
-              <a:rPr lang="en-US" altLang="zh-CN" dirty="0"/>
+              <a:rPr lang="en-US" altLang="zh-CN" dirty="0">
+                <a:latin typeface="Consolas" panose="020B0609020204030204" pitchFamily="49" charset="0"/>
+              </a:rPr>
               <a:t>: term frequency</a:t>
             </a:r>
           </a:p>
           <a:p>
             <a:pPr lvl="1"/>
             <a:r>
-              <a:rPr lang="en-US" altLang="zh-CN" dirty="0" err="1"/>
+              <a:rPr lang="en-US" altLang="zh-CN" dirty="0" err="1">
+                <a:latin typeface="Consolas" panose="020B0609020204030204" pitchFamily="49" charset="0"/>
+              </a:rPr>
               <a:t>idf</a:t>
             </a:r>
             <a:r>
+              <a:rPr lang="en-US" altLang="zh-CN" dirty="0">
+                <a:latin typeface="Consolas" panose="020B0609020204030204" pitchFamily="49" charset="0"/>
+              </a:rPr>
+              <a:t>: diminishes the weight of terms that occur very frequently</a:t>
+            </a:r>
+            <a:r>
               <a:rPr lang="en-US" altLang="zh-CN" dirty="0"/>
-              <a:t>: diminishes the weight of terms that occur very frequently</a:t>
+              <a:t/>
             </a:r>
             <a:br>
               <a:rPr lang="en-US" altLang="zh-CN" dirty="0"/>
@@ -31719,7 +31732,7 @@
         </p:nvSpPr>
         <p:spPr>
           <a:xfrm rot="5400000">
-            <a:off x="5804796" y="4627192"/>
+            <a:off x="5822971" y="4609303"/>
             <a:ext cx="978408" cy="484632"/>
           </a:xfrm>
           <a:prstGeom prst="homePlate">
@@ -31770,13 +31783,13 @@
           <p:nvPr>
             <p:extLst>
               <p:ext uri="{D42A27DB-BD31-4B8C-83A1-F6EECF244321}">
-                <p14:modId xmlns:p14="http://schemas.microsoft.com/office/powerpoint/2010/main" val="4156307706"/>
+                <p14:modId xmlns:p14="http://schemas.microsoft.com/office/powerpoint/2010/main" val="3270348281"/>
               </p:ext>
             </p:extLst>
           </p:nvPr>
         </p:nvGraphicFramePr>
         <p:xfrm>
-          <a:off x="6014356" y="5477081"/>
+          <a:off x="5975625" y="5558104"/>
           <a:ext cx="673100" cy="1051560"/>
         </p:xfrm>
         <a:graphic>
@@ -31989,6 +32002,62 @@
           </a:graphicData>
         </a:graphic>
       </p:graphicFrame>
+      <p:sp>
+        <p:nvSpPr>
+          <p:cNvPr id="41" name="Text Placeholder 1"/>
+          <p:cNvSpPr>
+            <a:spLocks noGrp="1"/>
+          </p:cNvSpPr>
+          <p:nvPr>
+            <p:ph type="body" sz="quarter" idx="10"/>
+          </p:nvPr>
+        </p:nvSpPr>
+        <p:spPr>
+          <a:xfrm>
+            <a:off x="311272" y="5168747"/>
+            <a:ext cx="4844390" cy="747897"/>
+          </a:xfrm>
+        </p:spPr>
+        <p:txBody>
+          <a:bodyPr/>
+          <a:lstStyle/>
+          <a:p>
+            <a:r>
+              <a:rPr lang="en-US" altLang="zh-CN" dirty="0" smtClean="0">
+                <a:latin typeface="Consolas" panose="020B0609020204030204" pitchFamily="49" charset="0"/>
+              </a:rPr>
+              <a:t>We can use the Train/Predict models in </a:t>
+            </a:r>
+            <a:r>
+              <a:rPr lang="en-US" altLang="zh-CN" dirty="0" err="1" smtClean="0">
+                <a:latin typeface="Consolas" panose="020B0609020204030204" pitchFamily="49" charset="0"/>
+              </a:rPr>
+              <a:t>sklearn</a:t>
+            </a:r>
+            <a:r>
+              <a:rPr lang="en-US" altLang="zh-CN" dirty="0" smtClean="0">
+                <a:latin typeface="Consolas" panose="020B0609020204030204" pitchFamily="49" charset="0"/>
+              </a:rPr>
+              <a:t>/</a:t>
+            </a:r>
+            <a:r>
+              <a:rPr lang="en-US" altLang="zh-CN" dirty="0" err="1" smtClean="0">
+                <a:latin typeface="Consolas" panose="020B0609020204030204" pitchFamily="49" charset="0"/>
+              </a:rPr>
+              <a:t>onnx</a:t>
+            </a:r>
+            <a:r>
+              <a:rPr lang="en-US" altLang="zh-CN" dirty="0" smtClean="0">
+                <a:latin typeface="Consolas" panose="020B0609020204030204" pitchFamily="49" charset="0"/>
+              </a:rPr>
+              <a:t> or other frameworks instead of implementing from scratch.</a:t>
+            </a:r>
+            <a:endParaRPr lang="en-US" altLang="zh-CN" dirty="0">
+              <a:latin typeface="Consolas" panose="020B0609020204030204" pitchFamily="49" charset="0"/>
+            </a:endParaRPr>
+          </a:p>
+        </p:txBody>
+      </p:sp>
     </p:spTree>
     <p:extLst>
       <p:ext uri="{BB962C8B-B14F-4D97-AF65-F5344CB8AC3E}">
@@ -32516,7 +32585,7 @@
         <p:spPr>
           <a:xfrm>
             <a:off x="309752" y="1232807"/>
-            <a:ext cx="7371207" cy="1957459"/>
+            <a:ext cx="7371207" cy="2072875"/>
           </a:xfrm>
         </p:spPr>
         <p:txBody>
@@ -32524,7 +32593,9 @@
           <a:lstStyle/>
           <a:p>
             <a:r>
-              <a:rPr lang="en-US" altLang="zh-CN" dirty="0"/>
+              <a:rPr lang="en-US" altLang="zh-CN" dirty="0">
+                <a:latin typeface="Consolas" panose="020B0609020204030204" pitchFamily="49" charset="0"/>
+              </a:rPr>
               <a:t>Predict result vector</a:t>
             </a:r>
           </a:p>
@@ -32543,6 +32614,11 @@
               </a:rPr>
               <a:t>Structured log file</a:t>
             </a:r>
+          </a:p>
+          <a:p>
+            <a:endParaRPr lang="en-US" altLang="zh-CN" dirty="0" smtClean="0">
+              <a:latin typeface="Consolas" panose="020B0609020204030204" pitchFamily="49" charset="0"/>
+            </a:endParaRPr>
           </a:p>
           <a:p>
             <a:endParaRPr lang="en-US" altLang="zh-CN" dirty="0">
@@ -32628,6 +32704,54 @@
           <a:p>
             <a:pPr algn="ctr"/>
             <a:endParaRPr lang="zh-CN" altLang="en-US"/>
+          </a:p>
+        </p:txBody>
+      </p:sp>
+      <p:sp>
+        <p:nvSpPr>
+          <p:cNvPr id="12" name="Down Arrow 11"/>
+          <p:cNvSpPr/>
+          <p:nvPr/>
+        </p:nvSpPr>
+        <p:spPr>
+          <a:xfrm>
+            <a:off x="3090019" y="2438657"/>
+            <a:ext cx="484632" cy="388755"/>
+          </a:xfrm>
+          <a:prstGeom prst="downArrow">
+            <a:avLst/>
+          </a:prstGeom>
+          <a:ln>
+            <a:prstDash val="sysDot"/>
+          </a:ln>
+        </p:spPr>
+        <p:style>
+          <a:lnRef idx="2">
+            <a:schemeClr val="dk1"/>
+          </a:lnRef>
+          <a:fillRef idx="1">
+            <a:schemeClr val="lt1"/>
+          </a:fillRef>
+          <a:effectRef idx="0">
+            <a:schemeClr val="dk1"/>
+          </a:effectRef>
+          <a:fontRef idx="minor">
+            <a:schemeClr val="dk1"/>
+          </a:fontRef>
+        </p:style>
+        <p:txBody>
+          <a:bodyPr rtlCol="0" anchor="ctr"/>
+          <a:lstStyle/>
+          <a:p>
+            <a:pPr algn="ctr">
+              <a:lnSpc>
+                <a:spcPct val="90000"/>
+              </a:lnSpc>
+              <a:spcBef>
+                <a:spcPts val="600"/>
+              </a:spcBef>
+            </a:pPr>
+            <a:endParaRPr lang="zh-CN" altLang="en-US" sz="2000" b="1" dirty="0" err="1" smtClean="0"/>
           </a:p>
         </p:txBody>
       </p:sp>
@@ -34577,7 +34701,7 @@
         <p:spPr>
           <a:xfrm>
             <a:off x="309752" y="1232807"/>
-            <a:ext cx="7371207" cy="2571473"/>
+            <a:ext cx="7641174" cy="1780359"/>
           </a:xfrm>
         </p:spPr>
         <p:txBody>
@@ -34585,27 +34709,33 @@
           <a:lstStyle/>
           <a:p>
             <a:r>
-              <a:rPr lang="en-US" altLang="zh-CN" dirty="0"/>
-              <a:t>It’s done in Log Parsing stage. Train and Test logs </a:t>
-            </a:r>
-            <a:r>
-              <a:rPr lang="en-US" altLang="zh-CN"/>
-              <a:t>all </a:t>
-            </a:r>
-            <a:r>
-              <a:rPr lang="en-US" altLang="zh-CN" smtClean="0"/>
+              <a:rPr lang="en-US" altLang="zh-CN" dirty="0">
+                <a:latin typeface="Consolas" panose="020B0609020204030204" pitchFamily="49" charset="0"/>
+              </a:rPr>
+              <a:t>It’s done in Log Parsing stage. Train and Test logs all </a:t>
+            </a:r>
+            <a:r>
+              <a:rPr lang="en-US" altLang="zh-CN" dirty="0" smtClean="0">
+                <a:latin typeface="Consolas" panose="020B0609020204030204" pitchFamily="49" charset="0"/>
+              </a:rPr>
               <a:t>pass </a:t>
             </a:r>
             <a:r>
-              <a:rPr lang="en-US" altLang="zh-CN" dirty="0"/>
+              <a:rPr lang="en-US" altLang="zh-CN" dirty="0">
+                <a:latin typeface="Consolas" panose="020B0609020204030204" pitchFamily="49" charset="0"/>
+              </a:rPr>
               <a:t>Parsing 1</a:t>
             </a:r>
             <a:r>
-              <a:rPr lang="en-US" altLang="zh-CN" baseline="30000" dirty="0"/>
+              <a:rPr lang="en-US" altLang="zh-CN" baseline="30000" dirty="0">
+                <a:latin typeface="Consolas" panose="020B0609020204030204" pitchFamily="49" charset="0"/>
+              </a:rPr>
               <a:t>st</a:t>
             </a:r>
             <a:r>
-              <a:rPr lang="en-US" altLang="zh-CN" dirty="0"/>
+              <a:rPr lang="en-US" altLang="zh-CN" dirty="0">
+                <a:latin typeface="Consolas" panose="020B0609020204030204" pitchFamily="49" charset="0"/>
+              </a:rPr>
               <a:t>.</a:t>
             </a:r>
           </a:p>
@@ -34686,13 +34816,13 @@
           <p:nvPr>
             <p:extLst>
               <p:ext uri="{D42A27DB-BD31-4B8C-83A1-F6EECF244321}">
-                <p14:modId xmlns:p14="http://schemas.microsoft.com/office/powerpoint/2010/main" val="122939904"/>
+                <p14:modId xmlns:p14="http://schemas.microsoft.com/office/powerpoint/2010/main" val="885664546"/>
               </p:ext>
             </p:extLst>
           </p:nvPr>
         </p:nvGraphicFramePr>
         <p:xfrm>
-          <a:off x="1136342" y="2759923"/>
+          <a:off x="1293097" y="3074126"/>
           <a:ext cx="5841200" cy="3487184"/>
         </p:xfrm>
         <a:graphic>
@@ -37564,7 +37694,7 @@
         <p:spPr>
           <a:xfrm>
             <a:off x="309752" y="1232807"/>
-            <a:ext cx="7371207" cy="1343445"/>
+            <a:ext cx="7710842" cy="4084195"/>
           </a:xfrm>
         </p:spPr>
         <p:txBody>
@@ -37572,25 +37702,119 @@
           <a:lstStyle/>
           <a:p>
             <a:r>
-              <a:rPr lang="en-US" altLang="zh-CN" dirty="0"/>
-              <a:t>Log parsing is not updated on old templates. Some issues.</a:t>
+              <a:rPr lang="en-US" altLang="zh-CN" dirty="0" smtClean="0">
+                <a:latin typeface="Consolas" panose="020B0609020204030204" pitchFamily="49" charset="0"/>
+              </a:rPr>
+              <a:t>Update Drain algorithm to the new version</a:t>
             </a:r>
           </a:p>
           <a:p>
             <a:r>
-              <a:rPr lang="en-US" altLang="zh-CN" dirty="0"/>
-              <a:t>Unsupervised learning is OK?</a:t>
-            </a:r>
+              <a:rPr lang="en-US" altLang="zh-CN" dirty="0" smtClean="0">
+                <a:latin typeface="Consolas" panose="020B0609020204030204" pitchFamily="49" charset="0"/>
+              </a:rPr>
+              <a:t>Incrementally updating templates w/ Drain based on old ones.</a:t>
+            </a:r>
+            <a:endParaRPr lang="en-US" altLang="zh-CN" dirty="0">
+              <a:latin typeface="Consolas" panose="020B0609020204030204" pitchFamily="49" charset="0"/>
+            </a:endParaRPr>
           </a:p>
           <a:p>
-            <a:r>
-              <a:rPr lang="en-US" altLang="zh-CN" dirty="0">
-                <a:latin typeface="Consolas" panose="020B0609020204030204" pitchFamily="49" charset="0"/>
-              </a:rPr>
-              <a:t>Need update and add more templates to the knowledgebase.</a:t>
+            <a:pPr lvl="1"/>
+            <a:r>
+              <a:rPr lang="en-US" altLang="zh-CN" dirty="0" smtClean="0">
+                <a:latin typeface="Consolas" panose="020B0609020204030204" pitchFamily="49" charset="0"/>
+              </a:rPr>
+              <a:t>This can fix the issue that some templates cannot be generated because of too few logs.</a:t>
             </a:r>
           </a:p>
           <a:p>
+            <a:pPr lvl="1"/>
+            <a:r>
+              <a:rPr lang="en-US" altLang="zh-CN" dirty="0" smtClean="0">
+                <a:latin typeface="Consolas" panose="020B0609020204030204" pitchFamily="49" charset="0"/>
+              </a:rPr>
+              <a:t>Prepare for the incremental learning for analyzer</a:t>
+            </a:r>
+          </a:p>
+          <a:p>
+            <a:r>
+              <a:rPr lang="en-US" altLang="zh-CN" dirty="0" smtClean="0">
+                <a:latin typeface="Consolas" panose="020B0609020204030204" pitchFamily="49" charset="0"/>
+              </a:rPr>
+              <a:t>Incremental learning.</a:t>
+            </a:r>
+          </a:p>
+          <a:p>
+            <a:pPr lvl="1"/>
+            <a:r>
+              <a:rPr lang="en-US" altLang="zh-CN" dirty="0" smtClean="0">
+                <a:latin typeface="Consolas" panose="020B0609020204030204" pitchFamily="49" charset="0"/>
+              </a:rPr>
+              <a:t>Current method needs one big training set and the model cannot learn incrementally.</a:t>
+            </a:r>
+          </a:p>
+          <a:p>
+            <a:pPr lvl="1"/>
+            <a:r>
+              <a:rPr lang="en-US" altLang="zh-CN" dirty="0" smtClean="0">
+                <a:latin typeface="Consolas" panose="020B0609020204030204" pitchFamily="49" charset="0"/>
+              </a:rPr>
+              <a:t>Because of the feature of logging, we should use incremental learning.</a:t>
+            </a:r>
+            <a:endParaRPr lang="en-US" altLang="zh-CN" dirty="0">
+              <a:latin typeface="Consolas" panose="020B0609020204030204" pitchFamily="49" charset="0"/>
+            </a:endParaRPr>
+          </a:p>
+          <a:p>
+            <a:r>
+              <a:rPr lang="en-US" altLang="zh-CN" dirty="0" smtClean="0">
+                <a:latin typeface="Consolas" panose="020B0609020204030204" pitchFamily="49" charset="0"/>
+              </a:rPr>
+              <a:t>Restructure the code to adapt NON-CM/NON-DOCSIS system logs</a:t>
+            </a:r>
+            <a:endParaRPr lang="en-US" altLang="zh-CN" dirty="0">
+              <a:latin typeface="Consolas" panose="020B0609020204030204" pitchFamily="49" charset="0"/>
+            </a:endParaRPr>
+          </a:p>
+          <a:p>
+            <a:pPr marL="0" indent="0">
+              <a:buNone/>
+            </a:pPr>
+            <a:r>
+              <a:rPr lang="en-US" altLang="zh-CN" dirty="0" smtClean="0">
+                <a:latin typeface="Consolas" panose="020B0609020204030204" pitchFamily="49" charset="0"/>
+              </a:rPr>
+              <a:t>-------------------------------</a:t>
+            </a:r>
+          </a:p>
+          <a:p>
+            <a:r>
+              <a:rPr lang="en-US" altLang="zh-CN" dirty="0" smtClean="0">
+                <a:latin typeface="Consolas" panose="020B0609020204030204" pitchFamily="49" charset="0"/>
+              </a:rPr>
+              <a:t>Long term improvement</a:t>
+            </a:r>
+          </a:p>
+          <a:p>
+            <a:pPr lvl="1"/>
+            <a:r>
+              <a:rPr lang="en-US" altLang="zh-CN" dirty="0">
+                <a:latin typeface="Consolas" panose="020B0609020204030204" pitchFamily="49" charset="0"/>
+              </a:rPr>
+              <a:t>Unsupervised </a:t>
+            </a:r>
+            <a:r>
+              <a:rPr lang="en-US" altLang="zh-CN" dirty="0" smtClean="0">
+                <a:latin typeface="Consolas" panose="020B0609020204030204" pitchFamily="49" charset="0"/>
+              </a:rPr>
+              <a:t>learning feasibility. Need investigate.</a:t>
+            </a:r>
+          </a:p>
+          <a:p>
+            <a:pPr marL="0" indent="0">
+              <a:buNone/>
+            </a:pPr>
             <a:endParaRPr lang="en-US" altLang="zh-CN" dirty="0">
               <a:latin typeface="Consolas" panose="020B0609020204030204" pitchFamily="49" charset="0"/>
             </a:endParaRPr>
@@ -37645,7 +37869,719 @@
   <p:timing>
     <p:tnLst>
       <p:par>
-        <p:cTn id="1" dur="indefinite" restart="never" nodeType="tmRoot"/>
+        <p:cTn id="1" dur="indefinite" restart="never" nodeType="tmRoot">
+          <p:childTnLst>
+            <p:seq concurrent="1" nextAc="seek">
+              <p:cTn id="2" dur="indefinite" nodeType="mainSeq">
+                <p:childTnLst>
+                  <p:par>
+                    <p:cTn id="3" fill="hold">
+                      <p:stCondLst>
+                        <p:cond delay="indefinite"/>
+                      </p:stCondLst>
+                      <p:childTnLst>
+                        <p:par>
+                          <p:cTn id="4" fill="hold">
+                            <p:stCondLst>
+                              <p:cond delay="0"/>
+                            </p:stCondLst>
+                            <p:childTnLst>
+                              <p:par>
+                                <p:cTn id="5" presetID="10" presetClass="entr" presetSubtype="0" fill="hold" nodeType="clickEffect">
+                                  <p:stCondLst>
+                                    <p:cond delay="0"/>
+                                  </p:stCondLst>
+                                  <p:childTnLst>
+                                    <p:set>
+                                      <p:cBhvr>
+                                        <p:cTn id="6" dur="1" fill="hold">
+                                          <p:stCondLst>
+                                            <p:cond delay="0"/>
+                                          </p:stCondLst>
+                                        </p:cTn>
+                                        <p:tgtEl>
+                                          <p:spTgt spid="2">
+                                            <p:txEl>
+                                              <p:pRg st="0" end="0"/>
+                                            </p:txEl>
+                                          </p:spTgt>
+                                        </p:tgtEl>
+                                        <p:attrNameLst>
+                                          <p:attrName>style.visibility</p:attrName>
+                                        </p:attrNameLst>
+                                      </p:cBhvr>
+                                      <p:to>
+                                        <p:strVal val="visible"/>
+                                      </p:to>
+                                    </p:set>
+                                    <p:animEffect transition="in" filter="fade">
+                                      <p:cBhvr>
+                                        <p:cTn id="7" dur="500"/>
+                                        <p:tgtEl>
+                                          <p:spTgt spid="2">
+                                            <p:txEl>
+                                              <p:pRg st="0" end="0"/>
+                                            </p:txEl>
+                                          </p:spTgt>
+                                        </p:tgtEl>
+                                      </p:cBhvr>
+                                    </p:animEffect>
+                                  </p:childTnLst>
+                                </p:cTn>
+                              </p:par>
+                            </p:childTnLst>
+                          </p:cTn>
+                        </p:par>
+                      </p:childTnLst>
+                    </p:cTn>
+                  </p:par>
+                  <p:par>
+                    <p:cTn id="8" fill="hold">
+                      <p:stCondLst>
+                        <p:cond delay="indefinite"/>
+                      </p:stCondLst>
+                      <p:childTnLst>
+                        <p:par>
+                          <p:cTn id="9" fill="hold">
+                            <p:stCondLst>
+                              <p:cond delay="0"/>
+                            </p:stCondLst>
+                            <p:childTnLst>
+                              <p:par>
+                                <p:cTn id="10" presetID="22" presetClass="entr" presetSubtype="4" fill="hold" nodeType="clickEffect">
+                                  <p:stCondLst>
+                                    <p:cond delay="0"/>
+                                  </p:stCondLst>
+                                  <p:childTnLst>
+                                    <p:set>
+                                      <p:cBhvr>
+                                        <p:cTn id="11" dur="1" fill="hold">
+                                          <p:stCondLst>
+                                            <p:cond delay="0"/>
+                                          </p:stCondLst>
+                                        </p:cTn>
+                                        <p:tgtEl>
+                                          <p:spTgt spid="2">
+                                            <p:txEl>
+                                              <p:pRg st="1" end="1"/>
+                                            </p:txEl>
+                                          </p:spTgt>
+                                        </p:tgtEl>
+                                        <p:attrNameLst>
+                                          <p:attrName>style.visibility</p:attrName>
+                                        </p:attrNameLst>
+                                      </p:cBhvr>
+                                      <p:to>
+                                        <p:strVal val="visible"/>
+                                      </p:to>
+                                    </p:set>
+                                    <p:animEffect transition="in" filter="wipe(down)">
+                                      <p:cBhvr>
+                                        <p:cTn id="12" dur="500"/>
+                                        <p:tgtEl>
+                                          <p:spTgt spid="2">
+                                            <p:txEl>
+                                              <p:pRg st="1" end="1"/>
+                                            </p:txEl>
+                                          </p:spTgt>
+                                        </p:tgtEl>
+                                      </p:cBhvr>
+                                    </p:animEffect>
+                                  </p:childTnLst>
+                                </p:cTn>
+                              </p:par>
+                              <p:par>
+                                <p:cTn id="13" presetID="22" presetClass="entr" presetSubtype="4" fill="hold" nodeType="withEffect">
+                                  <p:stCondLst>
+                                    <p:cond delay="0"/>
+                                  </p:stCondLst>
+                                  <p:childTnLst>
+                                    <p:set>
+                                      <p:cBhvr>
+                                        <p:cTn id="14" dur="1" fill="hold">
+                                          <p:stCondLst>
+                                            <p:cond delay="0"/>
+                                          </p:stCondLst>
+                                        </p:cTn>
+                                        <p:tgtEl>
+                                          <p:spTgt spid="2">
+                                            <p:txEl>
+                                              <p:pRg st="2" end="2"/>
+                                            </p:txEl>
+                                          </p:spTgt>
+                                        </p:tgtEl>
+                                        <p:attrNameLst>
+                                          <p:attrName>style.visibility</p:attrName>
+                                        </p:attrNameLst>
+                                      </p:cBhvr>
+                                      <p:to>
+                                        <p:strVal val="visible"/>
+                                      </p:to>
+                                    </p:set>
+                                    <p:animEffect transition="in" filter="wipe(down)">
+                                      <p:cBhvr>
+                                        <p:cTn id="15" dur="500"/>
+                                        <p:tgtEl>
+                                          <p:spTgt spid="2">
+                                            <p:txEl>
+                                              <p:pRg st="2" end="2"/>
+                                            </p:txEl>
+                                          </p:spTgt>
+                                        </p:tgtEl>
+                                      </p:cBhvr>
+                                    </p:animEffect>
+                                  </p:childTnLst>
+                                </p:cTn>
+                              </p:par>
+                              <p:par>
+                                <p:cTn id="16" presetID="22" presetClass="entr" presetSubtype="4" fill="hold" nodeType="withEffect">
+                                  <p:stCondLst>
+                                    <p:cond delay="0"/>
+                                  </p:stCondLst>
+                                  <p:childTnLst>
+                                    <p:set>
+                                      <p:cBhvr>
+                                        <p:cTn id="17" dur="1" fill="hold">
+                                          <p:stCondLst>
+                                            <p:cond delay="0"/>
+                                          </p:stCondLst>
+                                        </p:cTn>
+                                        <p:tgtEl>
+                                          <p:spTgt spid="2">
+                                            <p:txEl>
+                                              <p:pRg st="3" end="3"/>
+                                            </p:txEl>
+                                          </p:spTgt>
+                                        </p:tgtEl>
+                                        <p:attrNameLst>
+                                          <p:attrName>style.visibility</p:attrName>
+                                        </p:attrNameLst>
+                                      </p:cBhvr>
+                                      <p:to>
+                                        <p:strVal val="visible"/>
+                                      </p:to>
+                                    </p:set>
+                                    <p:animEffect transition="in" filter="wipe(down)">
+                                      <p:cBhvr>
+                                        <p:cTn id="18" dur="500"/>
+                                        <p:tgtEl>
+                                          <p:spTgt spid="2">
+                                            <p:txEl>
+                                              <p:pRg st="3" end="3"/>
+                                            </p:txEl>
+                                          </p:spTgt>
+                                        </p:tgtEl>
+                                      </p:cBhvr>
+                                    </p:animEffect>
+                                  </p:childTnLst>
+                                </p:cTn>
+                              </p:par>
+                            </p:childTnLst>
+                          </p:cTn>
+                        </p:par>
+                      </p:childTnLst>
+                    </p:cTn>
+                  </p:par>
+                  <p:par>
+                    <p:cTn id="19" fill="hold">
+                      <p:stCondLst>
+                        <p:cond delay="indefinite"/>
+                      </p:stCondLst>
+                      <p:childTnLst>
+                        <p:par>
+                          <p:cTn id="20" fill="hold">
+                            <p:stCondLst>
+                              <p:cond delay="0"/>
+                            </p:stCondLst>
+                            <p:childTnLst>
+                              <p:par>
+                                <p:cTn id="21" presetID="16" presetClass="entr" presetSubtype="21" fill="hold" nodeType="clickEffect">
+                                  <p:stCondLst>
+                                    <p:cond delay="0"/>
+                                  </p:stCondLst>
+                                  <p:childTnLst>
+                                    <p:set>
+                                      <p:cBhvr>
+                                        <p:cTn id="22" dur="1" fill="hold">
+                                          <p:stCondLst>
+                                            <p:cond delay="0"/>
+                                          </p:stCondLst>
+                                        </p:cTn>
+                                        <p:tgtEl>
+                                          <p:spTgt spid="2">
+                                            <p:txEl>
+                                              <p:pRg st="4" end="4"/>
+                                            </p:txEl>
+                                          </p:spTgt>
+                                        </p:tgtEl>
+                                        <p:attrNameLst>
+                                          <p:attrName>style.visibility</p:attrName>
+                                        </p:attrNameLst>
+                                      </p:cBhvr>
+                                      <p:to>
+                                        <p:strVal val="visible"/>
+                                      </p:to>
+                                    </p:set>
+                                    <p:animEffect transition="in" filter="barn(inVertical)">
+                                      <p:cBhvr>
+                                        <p:cTn id="23" dur="500"/>
+                                        <p:tgtEl>
+                                          <p:spTgt spid="2">
+                                            <p:txEl>
+                                              <p:pRg st="4" end="4"/>
+                                            </p:txEl>
+                                          </p:spTgt>
+                                        </p:tgtEl>
+                                      </p:cBhvr>
+                                    </p:animEffect>
+                                  </p:childTnLst>
+                                </p:cTn>
+                              </p:par>
+                              <p:par>
+                                <p:cTn id="24" presetID="16" presetClass="entr" presetSubtype="21" fill="hold" nodeType="withEffect">
+                                  <p:stCondLst>
+                                    <p:cond delay="0"/>
+                                  </p:stCondLst>
+                                  <p:childTnLst>
+                                    <p:set>
+                                      <p:cBhvr>
+                                        <p:cTn id="25" dur="1" fill="hold">
+                                          <p:stCondLst>
+                                            <p:cond delay="0"/>
+                                          </p:stCondLst>
+                                        </p:cTn>
+                                        <p:tgtEl>
+                                          <p:spTgt spid="2">
+                                            <p:txEl>
+                                              <p:pRg st="5" end="5"/>
+                                            </p:txEl>
+                                          </p:spTgt>
+                                        </p:tgtEl>
+                                        <p:attrNameLst>
+                                          <p:attrName>style.visibility</p:attrName>
+                                        </p:attrNameLst>
+                                      </p:cBhvr>
+                                      <p:to>
+                                        <p:strVal val="visible"/>
+                                      </p:to>
+                                    </p:set>
+                                    <p:animEffect transition="in" filter="barn(inVertical)">
+                                      <p:cBhvr>
+                                        <p:cTn id="26" dur="500"/>
+                                        <p:tgtEl>
+                                          <p:spTgt spid="2">
+                                            <p:txEl>
+                                              <p:pRg st="5" end="5"/>
+                                            </p:txEl>
+                                          </p:spTgt>
+                                        </p:tgtEl>
+                                      </p:cBhvr>
+                                    </p:animEffect>
+                                  </p:childTnLst>
+                                </p:cTn>
+                              </p:par>
+                              <p:par>
+                                <p:cTn id="27" presetID="16" presetClass="entr" presetSubtype="21" fill="hold" nodeType="withEffect">
+                                  <p:stCondLst>
+                                    <p:cond delay="0"/>
+                                  </p:stCondLst>
+                                  <p:childTnLst>
+                                    <p:set>
+                                      <p:cBhvr>
+                                        <p:cTn id="28" dur="1" fill="hold">
+                                          <p:stCondLst>
+                                            <p:cond delay="0"/>
+                                          </p:stCondLst>
+                                        </p:cTn>
+                                        <p:tgtEl>
+                                          <p:spTgt spid="2">
+                                            <p:txEl>
+                                              <p:pRg st="6" end="6"/>
+                                            </p:txEl>
+                                          </p:spTgt>
+                                        </p:tgtEl>
+                                        <p:attrNameLst>
+                                          <p:attrName>style.visibility</p:attrName>
+                                        </p:attrNameLst>
+                                      </p:cBhvr>
+                                      <p:to>
+                                        <p:strVal val="visible"/>
+                                      </p:to>
+                                    </p:set>
+                                    <p:animEffect transition="in" filter="barn(inVertical)">
+                                      <p:cBhvr>
+                                        <p:cTn id="29" dur="500"/>
+                                        <p:tgtEl>
+                                          <p:spTgt spid="2">
+                                            <p:txEl>
+                                              <p:pRg st="6" end="6"/>
+                                            </p:txEl>
+                                          </p:spTgt>
+                                        </p:tgtEl>
+                                      </p:cBhvr>
+                                    </p:animEffect>
+                                  </p:childTnLst>
+                                </p:cTn>
+                              </p:par>
+                            </p:childTnLst>
+                          </p:cTn>
+                        </p:par>
+                      </p:childTnLst>
+                    </p:cTn>
+                  </p:par>
+                  <p:par>
+                    <p:cTn id="30" fill="hold">
+                      <p:stCondLst>
+                        <p:cond delay="indefinite"/>
+                      </p:stCondLst>
+                      <p:childTnLst>
+                        <p:par>
+                          <p:cTn id="31" fill="hold">
+                            <p:stCondLst>
+                              <p:cond delay="0"/>
+                            </p:stCondLst>
+                            <p:childTnLst>
+                              <p:par>
+                                <p:cTn id="32" presetID="22" presetClass="entr" presetSubtype="4" fill="hold" nodeType="clickEffect">
+                                  <p:stCondLst>
+                                    <p:cond delay="0"/>
+                                  </p:stCondLst>
+                                  <p:childTnLst>
+                                    <p:set>
+                                      <p:cBhvr>
+                                        <p:cTn id="33" dur="1" fill="hold">
+                                          <p:stCondLst>
+                                            <p:cond delay="0"/>
+                                          </p:stCondLst>
+                                        </p:cTn>
+                                        <p:tgtEl>
+                                          <p:spTgt spid="2">
+                                            <p:txEl>
+                                              <p:pRg st="7" end="7"/>
+                                            </p:txEl>
+                                          </p:spTgt>
+                                        </p:tgtEl>
+                                        <p:attrNameLst>
+                                          <p:attrName>style.visibility</p:attrName>
+                                        </p:attrNameLst>
+                                      </p:cBhvr>
+                                      <p:to>
+                                        <p:strVal val="visible"/>
+                                      </p:to>
+                                    </p:set>
+                                    <p:animEffect transition="in" filter="wipe(down)">
+                                      <p:cBhvr>
+                                        <p:cTn id="34" dur="500"/>
+                                        <p:tgtEl>
+                                          <p:spTgt spid="2">
+                                            <p:txEl>
+                                              <p:pRg st="7" end="7"/>
+                                            </p:txEl>
+                                          </p:spTgt>
+                                        </p:tgtEl>
+                                      </p:cBhvr>
+                                    </p:animEffect>
+                                  </p:childTnLst>
+                                </p:cTn>
+                              </p:par>
+                            </p:childTnLst>
+                          </p:cTn>
+                        </p:par>
+                      </p:childTnLst>
+                    </p:cTn>
+                  </p:par>
+                  <p:par>
+                    <p:cTn id="35" fill="hold">
+                      <p:stCondLst>
+                        <p:cond delay="indefinite"/>
+                      </p:stCondLst>
+                      <p:childTnLst>
+                        <p:par>
+                          <p:cTn id="36" fill="hold">
+                            <p:stCondLst>
+                              <p:cond delay="0"/>
+                            </p:stCondLst>
+                            <p:childTnLst>
+                              <p:par>
+                                <p:cTn id="37" presetID="2" presetClass="entr" presetSubtype="4" fill="hold" nodeType="clickEffect">
+                                  <p:stCondLst>
+                                    <p:cond delay="0"/>
+                                  </p:stCondLst>
+                                  <p:childTnLst>
+                                    <p:set>
+                                      <p:cBhvr>
+                                        <p:cTn id="38" dur="1" fill="hold">
+                                          <p:stCondLst>
+                                            <p:cond delay="0"/>
+                                          </p:stCondLst>
+                                        </p:cTn>
+                                        <p:tgtEl>
+                                          <p:spTgt spid="2">
+                                            <p:txEl>
+                                              <p:pRg st="8" end="8"/>
+                                            </p:txEl>
+                                          </p:spTgt>
+                                        </p:tgtEl>
+                                        <p:attrNameLst>
+                                          <p:attrName>style.visibility</p:attrName>
+                                        </p:attrNameLst>
+                                      </p:cBhvr>
+                                      <p:to>
+                                        <p:strVal val="visible"/>
+                                      </p:to>
+                                    </p:set>
+                                    <p:anim calcmode="lin" valueType="num">
+                                      <p:cBhvr additive="base">
+                                        <p:cTn id="39" dur="500" fill="hold"/>
+                                        <p:tgtEl>
+                                          <p:spTgt spid="2">
+                                            <p:txEl>
+                                              <p:pRg st="8" end="8"/>
+                                            </p:txEl>
+                                          </p:spTgt>
+                                        </p:tgtEl>
+                                        <p:attrNameLst>
+                                          <p:attrName>ppt_x</p:attrName>
+                                        </p:attrNameLst>
+                                      </p:cBhvr>
+                                      <p:tavLst>
+                                        <p:tav tm="0">
+                                          <p:val>
+                                            <p:strVal val="#ppt_x"/>
+                                          </p:val>
+                                        </p:tav>
+                                        <p:tav tm="100000">
+                                          <p:val>
+                                            <p:strVal val="#ppt_x"/>
+                                          </p:val>
+                                        </p:tav>
+                                      </p:tavLst>
+                                    </p:anim>
+                                    <p:anim calcmode="lin" valueType="num">
+                                      <p:cBhvr additive="base">
+                                        <p:cTn id="40" dur="500" fill="hold"/>
+                                        <p:tgtEl>
+                                          <p:spTgt spid="2">
+                                            <p:txEl>
+                                              <p:pRg st="8" end="8"/>
+                                            </p:txEl>
+                                          </p:spTgt>
+                                        </p:tgtEl>
+                                        <p:attrNameLst>
+                                          <p:attrName>ppt_y</p:attrName>
+                                        </p:attrNameLst>
+                                      </p:cBhvr>
+                                      <p:tavLst>
+                                        <p:tav tm="0">
+                                          <p:val>
+                                            <p:strVal val="1+#ppt_h/2"/>
+                                          </p:val>
+                                        </p:tav>
+                                        <p:tav tm="100000">
+                                          <p:val>
+                                            <p:strVal val="#ppt_y"/>
+                                          </p:val>
+                                        </p:tav>
+                                      </p:tavLst>
+                                    </p:anim>
+                                  </p:childTnLst>
+                                </p:cTn>
+                              </p:par>
+                              <p:par>
+                                <p:cTn id="41" presetID="2" presetClass="entr" presetSubtype="4" fill="hold" nodeType="withEffect">
+                                  <p:stCondLst>
+                                    <p:cond delay="0"/>
+                                  </p:stCondLst>
+                                  <p:childTnLst>
+                                    <p:set>
+                                      <p:cBhvr>
+                                        <p:cTn id="42" dur="1" fill="hold">
+                                          <p:stCondLst>
+                                            <p:cond delay="0"/>
+                                          </p:stCondLst>
+                                        </p:cTn>
+                                        <p:tgtEl>
+                                          <p:spTgt spid="2">
+                                            <p:txEl>
+                                              <p:pRg st="9" end="9"/>
+                                            </p:txEl>
+                                          </p:spTgt>
+                                        </p:tgtEl>
+                                        <p:attrNameLst>
+                                          <p:attrName>style.visibility</p:attrName>
+                                        </p:attrNameLst>
+                                      </p:cBhvr>
+                                      <p:to>
+                                        <p:strVal val="visible"/>
+                                      </p:to>
+                                    </p:set>
+                                    <p:anim calcmode="lin" valueType="num">
+                                      <p:cBhvr additive="base">
+                                        <p:cTn id="43" dur="500" fill="hold"/>
+                                        <p:tgtEl>
+                                          <p:spTgt spid="2">
+                                            <p:txEl>
+                                              <p:pRg st="9" end="9"/>
+                                            </p:txEl>
+                                          </p:spTgt>
+                                        </p:tgtEl>
+                                        <p:attrNameLst>
+                                          <p:attrName>ppt_x</p:attrName>
+                                        </p:attrNameLst>
+                                      </p:cBhvr>
+                                      <p:tavLst>
+                                        <p:tav tm="0">
+                                          <p:val>
+                                            <p:strVal val="#ppt_x"/>
+                                          </p:val>
+                                        </p:tav>
+                                        <p:tav tm="100000">
+                                          <p:val>
+                                            <p:strVal val="#ppt_x"/>
+                                          </p:val>
+                                        </p:tav>
+                                      </p:tavLst>
+                                    </p:anim>
+                                    <p:anim calcmode="lin" valueType="num">
+                                      <p:cBhvr additive="base">
+                                        <p:cTn id="44" dur="500" fill="hold"/>
+                                        <p:tgtEl>
+                                          <p:spTgt spid="2">
+                                            <p:txEl>
+                                              <p:pRg st="9" end="9"/>
+                                            </p:txEl>
+                                          </p:spTgt>
+                                        </p:tgtEl>
+                                        <p:attrNameLst>
+                                          <p:attrName>ppt_y</p:attrName>
+                                        </p:attrNameLst>
+                                      </p:cBhvr>
+                                      <p:tavLst>
+                                        <p:tav tm="0">
+                                          <p:val>
+                                            <p:strVal val="1+#ppt_h/2"/>
+                                          </p:val>
+                                        </p:tav>
+                                        <p:tav tm="100000">
+                                          <p:val>
+                                            <p:strVal val="#ppt_y"/>
+                                          </p:val>
+                                        </p:tav>
+                                      </p:tavLst>
+                                    </p:anim>
+                                  </p:childTnLst>
+                                </p:cTn>
+                              </p:par>
+                              <p:par>
+                                <p:cTn id="45" presetID="2" presetClass="entr" presetSubtype="4" fill="hold" nodeType="withEffect">
+                                  <p:stCondLst>
+                                    <p:cond delay="0"/>
+                                  </p:stCondLst>
+                                  <p:childTnLst>
+                                    <p:set>
+                                      <p:cBhvr>
+                                        <p:cTn id="46" dur="1" fill="hold">
+                                          <p:stCondLst>
+                                            <p:cond delay="0"/>
+                                          </p:stCondLst>
+                                        </p:cTn>
+                                        <p:tgtEl>
+                                          <p:spTgt spid="2">
+                                            <p:txEl>
+                                              <p:pRg st="10" end="10"/>
+                                            </p:txEl>
+                                          </p:spTgt>
+                                        </p:tgtEl>
+                                        <p:attrNameLst>
+                                          <p:attrName>style.visibility</p:attrName>
+                                        </p:attrNameLst>
+                                      </p:cBhvr>
+                                      <p:to>
+                                        <p:strVal val="visible"/>
+                                      </p:to>
+                                    </p:set>
+                                    <p:anim calcmode="lin" valueType="num">
+                                      <p:cBhvr additive="base">
+                                        <p:cTn id="47" dur="500" fill="hold"/>
+                                        <p:tgtEl>
+                                          <p:spTgt spid="2">
+                                            <p:txEl>
+                                              <p:pRg st="10" end="10"/>
+                                            </p:txEl>
+                                          </p:spTgt>
+                                        </p:tgtEl>
+                                        <p:attrNameLst>
+                                          <p:attrName>ppt_x</p:attrName>
+                                        </p:attrNameLst>
+                                      </p:cBhvr>
+                                      <p:tavLst>
+                                        <p:tav tm="0">
+                                          <p:val>
+                                            <p:strVal val="#ppt_x"/>
+                                          </p:val>
+                                        </p:tav>
+                                        <p:tav tm="100000">
+                                          <p:val>
+                                            <p:strVal val="#ppt_x"/>
+                                          </p:val>
+                                        </p:tav>
+                                      </p:tavLst>
+                                    </p:anim>
+                                    <p:anim calcmode="lin" valueType="num">
+                                      <p:cBhvr additive="base">
+                                        <p:cTn id="48" dur="500" fill="hold"/>
+                                        <p:tgtEl>
+                                          <p:spTgt spid="2">
+                                            <p:txEl>
+                                              <p:pRg st="10" end="10"/>
+                                            </p:txEl>
+                                          </p:spTgt>
+                                        </p:tgtEl>
+                                        <p:attrNameLst>
+                                          <p:attrName>ppt_y</p:attrName>
+                                        </p:attrNameLst>
+                                      </p:cBhvr>
+                                      <p:tavLst>
+                                        <p:tav tm="0">
+                                          <p:val>
+                                            <p:strVal val="1+#ppt_h/2"/>
+                                          </p:val>
+                                        </p:tav>
+                                        <p:tav tm="100000">
+                                          <p:val>
+                                            <p:strVal val="#ppt_y"/>
+                                          </p:val>
+                                        </p:tav>
+                                      </p:tavLst>
+                                    </p:anim>
+                                  </p:childTnLst>
+                                </p:cTn>
+                              </p:par>
+                            </p:childTnLst>
+                          </p:cTn>
+                        </p:par>
+                      </p:childTnLst>
+                    </p:cTn>
+                  </p:par>
+                </p:childTnLst>
+              </p:cTn>
+              <p:prevCondLst>
+                <p:cond evt="onPrev" delay="0">
+                  <p:tgtEl>
+                    <p:sldTgt/>
+                  </p:tgtEl>
+                </p:cond>
+              </p:prevCondLst>
+              <p:nextCondLst>
+                <p:cond evt="onNext" delay="0">
+                  <p:tgtEl>
+                    <p:sldTgt/>
+                  </p:tgtEl>
+                </p:cond>
+              </p:nextCondLst>
+            </p:seq>
+          </p:childTnLst>
+        </p:cTn>
       </p:par>
     </p:tnLst>
   </p:timing>
@@ -37681,8 +38617,8 @@
         </p:nvSpPr>
         <p:spPr>
           <a:xfrm>
-            <a:off x="309752" y="1232807"/>
-            <a:ext cx="7371207" cy="2705356"/>
+            <a:off x="309751" y="1232807"/>
+            <a:ext cx="8442363" cy="3319370"/>
           </a:xfrm>
         </p:spPr>
         <p:txBody>
@@ -37690,8 +38626,20 @@
           <a:lstStyle/>
           <a:p>
             <a:r>
+              <a:rPr lang="en-US" altLang="zh-CN" dirty="0" smtClean="0"/>
+              <a:t>[1] Pinjia </a:t>
+            </a:r>
+            <a:r>
               <a:rPr lang="en-US" altLang="zh-CN" dirty="0"/>
-              <a:t>Pinjia He, Jieming Zhu, Zibin Zheng, and Michael R. </a:t>
+              <a:t>He, Jieming Zhu, Zibin Zheng, </a:t>
+            </a:r>
+            <a:r>
+              <a:rPr lang="en-US" altLang="zh-CN" dirty="0" smtClean="0"/>
+              <a:t>Michael </a:t>
+            </a:r>
+            <a:r>
+              <a:rPr lang="en-US" altLang="zh-CN" dirty="0"/>
+              <a:t>R. </a:t>
             </a:r>
             <a:r>
               <a:rPr lang="en-US" altLang="zh-CN" dirty="0" smtClean="0"/>
@@ -37707,32 +38655,56 @@
               <a:rPr lang="en-US" altLang="zh-CN" dirty="0">
                 <a:hlinkClick r:id="rId2"/>
               </a:rPr>
-              <a:t>: An Online Log Parsing Approach with Fixed Depth </a:t>
+              <a:t>: An Online Log </a:t>
             </a:r>
             <a:r>
               <a:rPr lang="en-US" altLang="zh-CN" dirty="0" smtClean="0">
                 <a:hlinkClick r:id="rId2"/>
               </a:rPr>
+              <a:t>         Parsing </a:t>
+            </a:r>
+            <a:r>
+              <a:rPr lang="en-US" altLang="zh-CN" dirty="0">
+                <a:hlinkClick r:id="rId2"/>
+              </a:rPr>
+              <a:t>Approach with Fixed Depth </a:t>
+            </a:r>
+            <a:r>
+              <a:rPr lang="en-US" altLang="zh-CN" dirty="0" smtClean="0">
+                <a:hlinkClick r:id="rId2"/>
+              </a:rPr>
               <a:t>Tree</a:t>
             </a:r>
             <a:r>
               <a:rPr lang="en-US" altLang="zh-CN" dirty="0" smtClean="0"/>
-              <a:t>, </a:t>
-            </a:r>
-            <a:r>
-              <a:rPr lang="en-US" altLang="zh-CN" i="1" dirty="0" smtClean="0"/>
-              <a:t>[</a:t>
-            </a:r>
-            <a:r>
-              <a:rPr lang="en-US" altLang="zh-CN" i="1" dirty="0"/>
-              <a:t>ICWS'17] </a:t>
-            </a:r>
-            <a:endParaRPr lang="en-US" altLang="zh-CN" i="1" dirty="0" smtClean="0"/>
+              <a:t>, [ICWS’17</a:t>
+            </a:r>
+            <a:r>
+              <a:rPr lang="en-US" altLang="zh-CN" dirty="0"/>
+              <a:t>] </a:t>
+            </a:r>
+            <a:endParaRPr lang="en-US" altLang="zh-CN" dirty="0" smtClean="0"/>
           </a:p>
           <a:p>
             <a:r>
               <a:rPr lang="en-US" altLang="zh-CN" dirty="0" smtClean="0"/>
-              <a:t>Shilin </a:t>
+              <a:t>[2] Pinjia He, Jieming Zhu, Hongyu Zhang, Pengcheng Xu, Zibin Zheng, Michael R. Lyu. </a:t>
+            </a:r>
+            <a:r>
+              <a:rPr lang="en-US" altLang="zh-CN" dirty="0" smtClean="0">
+                <a:hlinkClick r:id="rId3"/>
+              </a:rPr>
+              <a:t>A Directed Acyclic Graph Approach to Online Log Parsing</a:t>
+            </a:r>
+            <a:r>
+              <a:rPr lang="en-US" altLang="zh-CN" dirty="0" smtClean="0"/>
+              <a:t>, [Arxiv’18]</a:t>
+            </a:r>
+          </a:p>
+          <a:p>
+            <a:r>
+              <a:rPr lang="en-US" altLang="zh-CN" dirty="0" smtClean="0"/>
+              <a:t>[3] Shilin </a:t>
             </a:r>
             <a:r>
               <a:rPr lang="en-US" altLang="zh-CN" dirty="0"/>
@@ -37740,7 +38712,7 @@
             </a:r>
             <a:r>
               <a:rPr lang="en-US" altLang="zh-CN" dirty="0">
-                <a:hlinkClick r:id="rId3"/>
+                <a:hlinkClick r:id="rId4"/>
               </a:rPr>
               <a:t>Experience Report: System Log Analysis for Anomaly Detection</a:t>
             </a:r>
@@ -37763,68 +38735,66 @@
           </a:p>
           <a:p>
             <a:r>
+              <a:rPr lang="en-US" altLang="zh-CN" dirty="0" smtClean="0"/>
+              <a:t>[4] </a:t>
+            </a:r>
+            <a:r>
+              <a:rPr lang="en-US" altLang="zh-CN" dirty="0" smtClean="0">
+                <a:hlinkClick r:id="rId5"/>
+              </a:rPr>
+              <a:t>https</a:t>
+            </a:r>
+            <a:r>
               <a:rPr lang="en-US" altLang="zh-CN" dirty="0">
-                <a:latin typeface="Consolas" panose="020B0609020204030204" pitchFamily="49" charset="0"/>
-                <a:hlinkClick r:id="rId4"/>
-              </a:rPr>
-              <a:t>https://</a:t>
+                <a:hlinkClick r:id="rId5"/>
+              </a:rPr>
+              <a:t>://</a:t>
             </a:r>
             <a:r>
               <a:rPr lang="en-US" altLang="zh-CN" dirty="0" smtClean="0">
-                <a:latin typeface="Consolas" panose="020B0609020204030204" pitchFamily="49" charset="0"/>
-                <a:hlinkClick r:id="rId4"/>
+                <a:hlinkClick r:id="rId5"/>
               </a:rPr>
               <a:t>en.wikipedia.org/wiki/Tf-idf</a:t>
             </a:r>
-            <a:endParaRPr lang="en-US" altLang="zh-CN" dirty="0">
-              <a:latin typeface="Consolas" panose="020B0609020204030204" pitchFamily="49" charset="0"/>
-              <a:hlinkClick r:id="rId4"/>
-            </a:endParaRPr>
+            <a:endParaRPr lang="en-US" altLang="zh-CN" dirty="0"/>
           </a:p>
           <a:p>
             <a:r>
+              <a:rPr lang="en-US" altLang="zh-CN" dirty="0" smtClean="0"/>
+              <a:t>[5] </a:t>
+            </a:r>
+            <a:r>
               <a:rPr lang="en-US" altLang="zh-CN" dirty="0" smtClean="0">
-                <a:latin typeface="Consolas" panose="020B0609020204030204" pitchFamily="49" charset="0"/>
-                <a:hlinkClick r:id="rId5"/>
+                <a:hlinkClick r:id="rId6"/>
               </a:rPr>
               <a:t>https</a:t>
             </a:r>
             <a:r>
               <a:rPr lang="en-US" altLang="zh-CN" dirty="0">
-                <a:latin typeface="Consolas" panose="020B0609020204030204" pitchFamily="49" charset="0"/>
-                <a:hlinkClick r:id="rId5"/>
+                <a:hlinkClick r:id="rId6"/>
               </a:rPr>
               <a:t>://</a:t>
             </a:r>
             <a:r>
               <a:rPr lang="en-US" altLang="zh-CN" dirty="0" smtClean="0">
-                <a:latin typeface="Consolas" panose="020B0609020204030204" pitchFamily="49" charset="0"/>
-                <a:hlinkClick r:id="rId5"/>
+                <a:hlinkClick r:id="rId6"/>
               </a:rPr>
               <a:t>archive.ics.uci.edu/ml/datasets/Iris</a:t>
             </a:r>
-            <a:endParaRPr lang="en-US" altLang="zh-CN" dirty="0" smtClean="0">
-              <a:latin typeface="Consolas" panose="020B0609020204030204" pitchFamily="49" charset="0"/>
-            </a:endParaRPr>
+            <a:endParaRPr lang="en-US" altLang="zh-CN" dirty="0" smtClean="0"/>
           </a:p>
           <a:p>
             <a:r>
-              <a:rPr lang="en-US" altLang="zh-CN" dirty="0">
-                <a:latin typeface="Consolas" panose="020B0609020204030204" pitchFamily="49" charset="0"/>
-                <a:hlinkClick r:id="rId6"/>
-              </a:rPr>
-              <a:t>https://</a:t>
+              <a:rPr lang="en-US" altLang="zh-CN" dirty="0" smtClean="0"/>
+              <a:t>[6] </a:t>
             </a:r>
             <a:r>
               <a:rPr lang="en-US" altLang="zh-CN" dirty="0" smtClean="0">
-                <a:latin typeface="Consolas" panose="020B0609020204030204" pitchFamily="49" charset="0"/>
-                <a:hlinkClick r:id="rId6"/>
-              </a:rPr>
-              <a:t>www.datasciencecentral.com/profiles/blogs/introduction-to-classification-regression-trees-cart</a:t>
-            </a:r>
-            <a:endParaRPr lang="en-US" altLang="zh-CN" dirty="0" smtClean="0">
-              <a:latin typeface="Consolas" panose="020B0609020204030204" pitchFamily="49" charset="0"/>
-            </a:endParaRPr>
+                <a:hlinkClick r:id="rId7"/>
+              </a:rPr>
+              <a:t>https://datasciencecentral.com/profiles/blogs/introduction-to-classification-   regression-trees-cart</a:t>
+            </a:r>
+            <a:endParaRPr lang="en-US" altLang="zh-CN" dirty="0" smtClean="0"/>
           </a:p>
         </p:txBody>
       </p:sp>
@@ -38111,7 +39081,42 @@
                 <a:latin typeface="Fira Code" panose="020B0809050000020004" pitchFamily="49" charset="0"/>
                 <a:ea typeface="Fira Code" panose="020B0809050000020004" pitchFamily="49" charset="0"/>
               </a:rPr>
-              <a:t>numpy, scipy, scikit-learn, pandas, skl2onnx, onnxruntime</a:t>
+              <a:t>numpy, </a:t>
+            </a:r>
+            <a:r>
+              <a:rPr lang="en-US" altLang="zh-CN" i="1" dirty="0">
+                <a:latin typeface="Fira Code" panose="020B0809050000020004" pitchFamily="49" charset="0"/>
+                <a:ea typeface="Fira Code" panose="020B0809050000020004" pitchFamily="49" charset="0"/>
+              </a:rPr>
+              <a:t>pandas, </a:t>
+            </a:r>
+            <a:r>
+              <a:rPr lang="en-US" i="1" dirty="0" smtClean="0">
+                <a:latin typeface="Fira Code" panose="020B0809050000020004" pitchFamily="49" charset="0"/>
+                <a:ea typeface="Fira Code" panose="020B0809050000020004" pitchFamily="49" charset="0"/>
+              </a:rPr>
+              <a:t>scipy</a:t>
+            </a:r>
+            <a:r>
+              <a:rPr lang="en-US" i="1" dirty="0">
+                <a:latin typeface="Fira Code" panose="020B0809050000020004" pitchFamily="49" charset="0"/>
+                <a:ea typeface="Fira Code" panose="020B0809050000020004" pitchFamily="49" charset="0"/>
+              </a:rPr>
+              <a:t>, scikit-learn, </a:t>
+            </a:r>
+            <a:r>
+              <a:rPr lang="en-US" i="1" dirty="0" smtClean="0">
+                <a:latin typeface="Fira Code" panose="020B0809050000020004" pitchFamily="49" charset="0"/>
+                <a:ea typeface="Fira Code" panose="020B0809050000020004" pitchFamily="49" charset="0"/>
+              </a:rPr>
+              <a:t>skl2onnx</a:t>
+            </a:r>
+            <a:r>
+              <a:rPr lang="en-US" i="1" dirty="0">
+                <a:latin typeface="Fira Code" panose="020B0809050000020004" pitchFamily="49" charset="0"/>
+                <a:ea typeface="Fira Code" panose="020B0809050000020004" pitchFamily="49" charset="0"/>
+              </a:rPr>
+              <a:t>, onnxruntime</a:t>
             </a:r>
           </a:p>
           <a:p>

</xml_diff>